<commit_message>
Added information to mysql lection
</commit_message>
<xml_diff>
--- a/09.introduction-to-mysql.pptx
+++ b/09.introduction-to-mysql.pptx
@@ -6601,21 +6601,45 @@
           <a:p>
             <a:r>
               <a:rPr lang="bg-BG" dirty="0" smtClean="0"/>
-              <a:t>Създадени са за да съхраняват данни</a:t>
-            </a:r>
+              <a:t>База данни означава количество информация организирана по начин по който компютърен език или програма може лесно да управлява тези данни</a:t>
+            </a:r>
+            <a:endParaRPr lang="bg-BG" dirty="0" smtClean="0"/>
           </a:p>
           <a:p>
             <a:r>
               <a:rPr lang="bg-BG" dirty="0" smtClean="0"/>
-              <a:t>Управляват информацията по-ефективно от програмния код</a:t>
-            </a:r>
-          </a:p>
-          <a:p>
+              <a:t>Управляват информацията по-ефективно от </a:t>
+            </a:r>
             <a:r>
               <a:rPr lang="bg-BG" dirty="0" smtClean="0"/>
-              <a:t>Делят се на Релационни и Нерелационни според вида по който съхраняват информацията</a:t>
-            </a:r>
-            <a:endParaRPr lang="bg-BG" dirty="0"/>
+              <a:t>програмен код</a:t>
+            </a:r>
+          </a:p>
+          <a:p>
+            <a:r>
+              <a:rPr lang="bg-BG" dirty="0" smtClean="0"/>
+              <a:t>Има много видове бази данни като най-разпространената за работа с </a:t>
+            </a:r>
+            <a:r>
+              <a:rPr lang="en-US" dirty="0" err="1" smtClean="0"/>
+              <a:t>php</a:t>
+            </a:r>
+            <a:r>
+              <a:rPr lang="en-US" dirty="0" smtClean="0"/>
+              <a:t> </a:t>
+            </a:r>
+            <a:r>
+              <a:rPr lang="bg-BG" dirty="0" smtClean="0"/>
+              <a:t>е </a:t>
+            </a:r>
+            <a:r>
+              <a:rPr lang="en-US" dirty="0" err="1" smtClean="0"/>
+              <a:t>mysql</a:t>
+            </a:r>
+            <a:endParaRPr lang="bg-BG" dirty="0" smtClean="0"/>
+          </a:p>
+          <a:p>
+            <a:endParaRPr lang="bg-BG" dirty="0" smtClean="0"/>
           </a:p>
           <a:p>
             <a:pPr marL="0" indent="0">
@@ -6671,8 +6695,20 @@
           <a:lstStyle/>
           <a:p>
             <a:r>
+              <a:rPr lang="bg-BG" dirty="0" err="1" smtClean="0"/>
+              <a:t>ВИдове</a:t>
+            </a:r>
+            <a:r>
               <a:rPr lang="bg-BG" dirty="0" smtClean="0"/>
-              <a:t>Релационни бази данни</a:t>
+              <a:t> </a:t>
+            </a:r>
+            <a:r>
+              <a:rPr lang="bg-BG" dirty="0" smtClean="0"/>
+              <a:t>бази </a:t>
+            </a:r>
+            <a:r>
+              <a:rPr lang="bg-BG" dirty="0" smtClean="0"/>
+              <a:t>данни</a:t>
             </a:r>
             <a:endParaRPr lang="en-US" dirty="0"/>
           </a:p>
@@ -6709,11 +6745,28 @@
               <a:rPr lang="bg-BG" dirty="0" smtClean="0"/>
               <a:t>Релационни</a:t>
             </a:r>
-          </a:p>
-          <a:p>
+            <a:r>
+              <a:rPr lang="en-US" dirty="0" smtClean="0"/>
+              <a:t> (</a:t>
+            </a:r>
             <a:r>
               <a:rPr lang="bg-BG" dirty="0" smtClean="0"/>
-              <a:t>Обектно ориентирани</a:t>
+              <a:t>таблица</a:t>
+            </a:r>
+            <a:r>
+              <a:rPr lang="en-US" dirty="0" smtClean="0"/>
+              <a:t>)</a:t>
+            </a:r>
+            <a:endParaRPr lang="bg-BG" dirty="0" smtClean="0"/>
+          </a:p>
+          <a:p>
+            <a:r>
+              <a:rPr lang="bg-BG" dirty="0" smtClean="0"/>
+              <a:t>Обектно </a:t>
+            </a:r>
+            <a:r>
+              <a:rPr lang="bg-BG" dirty="0" smtClean="0"/>
+              <a:t>ориентирани </a:t>
             </a:r>
             <a:endParaRPr lang="en-US" dirty="0"/>
           </a:p>

</xml_diff>

<commit_message>
Added MySQL Lection and examples
</commit_message>
<xml_diff>
--- a/09.introduction-to-mysql.pptx
+++ b/09.introduction-to-mysql.pptx
@@ -5,12 +5,32 @@
     <p:sldMasterId id="2147483660" r:id="rId1"/>
   </p:sldMasterIdLst>
   <p:notesMasterIdLst>
-    <p:notesMasterId r:id="rId5"/>
+    <p:notesMasterId r:id="rId25"/>
   </p:notesMasterIdLst>
   <p:sldIdLst>
     <p:sldId id="256" r:id="rId2"/>
     <p:sldId id="257" r:id="rId3"/>
     <p:sldId id="258" r:id="rId4"/>
+    <p:sldId id="259" r:id="rId5"/>
+    <p:sldId id="260" r:id="rId6"/>
+    <p:sldId id="261" r:id="rId7"/>
+    <p:sldId id="262" r:id="rId8"/>
+    <p:sldId id="265" r:id="rId9"/>
+    <p:sldId id="266" r:id="rId10"/>
+    <p:sldId id="263" r:id="rId11"/>
+    <p:sldId id="264" r:id="rId12"/>
+    <p:sldId id="267" r:id="rId13"/>
+    <p:sldId id="268" r:id="rId14"/>
+    <p:sldId id="269" r:id="rId15"/>
+    <p:sldId id="270" r:id="rId16"/>
+    <p:sldId id="271" r:id="rId17"/>
+    <p:sldId id="272" r:id="rId18"/>
+    <p:sldId id="273" r:id="rId19"/>
+    <p:sldId id="274" r:id="rId20"/>
+    <p:sldId id="275" r:id="rId21"/>
+    <p:sldId id="276" r:id="rId22"/>
+    <p:sldId id="277" r:id="rId23"/>
+    <p:sldId id="278" r:id="rId24"/>
   </p:sldIdLst>
   <p:sldSz cx="12192000" cy="6858000"/>
   <p:notesSz cx="6858000" cy="9144000"/>
@@ -6544,6 +6564,1247 @@
 </p:sld>
 </file>
 
+<file path=ppt/slides/slide10.xml><?xml version="1.0" encoding="utf-8"?>
+<p:sld xmlns:a="http://schemas.openxmlformats.org/drawingml/2006/main" xmlns:r="http://schemas.openxmlformats.org/officeDocument/2006/relationships" xmlns:p="http://schemas.openxmlformats.org/presentationml/2006/main">
+  <p:cSld>
+    <p:spTree>
+      <p:nvGrpSpPr>
+        <p:cNvPr id="1" name=""/>
+        <p:cNvGrpSpPr/>
+        <p:nvPr/>
+      </p:nvGrpSpPr>
+      <p:grpSpPr>
+        <a:xfrm>
+          <a:off x="0" y="0"/>
+          <a:ext cx="0" cy="0"/>
+          <a:chOff x="0" y="0"/>
+          <a:chExt cx="0" cy="0"/>
+        </a:xfrm>
+      </p:grpSpPr>
+      <p:sp>
+        <p:nvSpPr>
+          <p:cNvPr id="2" name="Title 1"/>
+          <p:cNvSpPr>
+            <a:spLocks noGrp="1"/>
+          </p:cNvSpPr>
+          <p:nvPr>
+            <p:ph type="title"/>
+          </p:nvPr>
+        </p:nvSpPr>
+        <p:spPr/>
+        <p:txBody>
+          <a:bodyPr/>
+          <a:lstStyle/>
+          <a:p>
+            <a:r>
+              <a:rPr lang="bg-BG" dirty="0" smtClean="0"/>
+              <a:t>Въвеждане на информация в таблици</a:t>
+            </a:r>
+            <a:endParaRPr lang="en-US" dirty="0"/>
+          </a:p>
+        </p:txBody>
+      </p:sp>
+      <p:sp>
+        <p:nvSpPr>
+          <p:cNvPr id="3" name="Content Placeholder 2"/>
+          <p:cNvSpPr>
+            <a:spLocks noGrp="1"/>
+          </p:cNvSpPr>
+          <p:nvPr>
+            <p:ph sz="quarter" idx="13"/>
+          </p:nvPr>
+        </p:nvSpPr>
+        <p:spPr/>
+        <p:txBody>
+          <a:bodyPr/>
+          <a:lstStyle/>
+          <a:p>
+            <a:r>
+              <a:rPr lang="bg-BG" dirty="0" smtClean="0"/>
+              <a:t>Въвеждането на информация става чрез командата </a:t>
+            </a:r>
+            <a:r>
+              <a:rPr lang="en-US" dirty="0" smtClean="0"/>
+              <a:t>insert</a:t>
+            </a:r>
+          </a:p>
+          <a:p>
+            <a:r>
+              <a:rPr lang="bg-BG" dirty="0" smtClean="0"/>
+              <a:t>Можем да въвеждаме множество колони едновременно</a:t>
+            </a:r>
+          </a:p>
+          <a:p>
+            <a:r>
+              <a:rPr lang="bg-BG" dirty="0" smtClean="0"/>
+              <a:t>Ако при въвеждане се нарушава заложено правило на таблицата заявката не се изпълнява</a:t>
+            </a:r>
+            <a:endParaRPr lang="en-US" dirty="0"/>
+          </a:p>
+        </p:txBody>
+      </p:sp>
+    </p:spTree>
+    <p:extLst>
+      <p:ext uri="{BB962C8B-B14F-4D97-AF65-F5344CB8AC3E}">
+        <p14:creationId xmlns:p14="http://schemas.microsoft.com/office/powerpoint/2010/main" val="1138902301"/>
+      </p:ext>
+    </p:extLst>
+  </p:cSld>
+  <p:clrMapOvr>
+    <a:masterClrMapping/>
+  </p:clrMapOvr>
+</p:sld>
+</file>
+
+<file path=ppt/slides/slide11.xml><?xml version="1.0" encoding="utf-8"?>
+<p:sld xmlns:a="http://schemas.openxmlformats.org/drawingml/2006/main" xmlns:r="http://schemas.openxmlformats.org/officeDocument/2006/relationships" xmlns:p="http://schemas.openxmlformats.org/presentationml/2006/main">
+  <p:cSld>
+    <p:spTree>
+      <p:nvGrpSpPr>
+        <p:cNvPr id="1" name=""/>
+        <p:cNvGrpSpPr/>
+        <p:nvPr/>
+      </p:nvGrpSpPr>
+      <p:grpSpPr>
+        <a:xfrm>
+          <a:off x="0" y="0"/>
+          <a:ext cx="0" cy="0"/>
+          <a:chOff x="0" y="0"/>
+          <a:chExt cx="0" cy="0"/>
+        </a:xfrm>
+      </p:grpSpPr>
+      <p:sp>
+        <p:nvSpPr>
+          <p:cNvPr id="2" name="Title 1"/>
+          <p:cNvSpPr>
+            <a:spLocks noGrp="1"/>
+          </p:cNvSpPr>
+          <p:nvPr>
+            <p:ph type="title"/>
+          </p:nvPr>
+        </p:nvSpPr>
+        <p:spPr/>
+        <p:txBody>
+          <a:bodyPr/>
+          <a:lstStyle/>
+          <a:p>
+            <a:r>
+              <a:rPr lang="bg-BG" dirty="0"/>
+              <a:t>Въвеждане на информация в </a:t>
+            </a:r>
+            <a:r>
+              <a:rPr lang="bg-BG" dirty="0" smtClean="0"/>
+              <a:t>таблици</a:t>
+            </a:r>
+            <a:r>
+              <a:rPr lang="en-US" dirty="0" smtClean="0"/>
+              <a:t> demo</a:t>
+            </a:r>
+            <a:endParaRPr lang="en-US" dirty="0"/>
+          </a:p>
+        </p:txBody>
+      </p:sp>
+      <p:pic>
+        <p:nvPicPr>
+          <p:cNvPr id="3074" name="Picture 2" descr="https://www.udemy.com/blog/wp-content/uploads/2014/05/bigstock-D-Database-Saving-Data-In-Tab-42793819-300x150.jpg"/>
+          <p:cNvPicPr>
+            <a:picLocks noChangeAspect="1" noChangeArrowheads="1"/>
+          </p:cNvPicPr>
+          <p:nvPr/>
+        </p:nvPicPr>
+        <p:blipFill>
+          <a:blip r:embed="rId2">
+            <a:extLst>
+              <a:ext uri="{28A0092B-C50C-407E-A947-70E740481C1C}">
+                <a14:useLocalDpi xmlns:a14="http://schemas.microsoft.com/office/drawing/2010/main" val="0"/>
+              </a:ext>
+            </a:extLst>
+          </a:blip>
+          <a:srcRect/>
+          <a:stretch>
+            <a:fillRect/>
+          </a:stretch>
+        </p:blipFill>
+        <p:spPr bwMode="auto">
+          <a:xfrm>
+            <a:off x="2537959" y="2214694"/>
+            <a:ext cx="7116082" cy="3558041"/>
+          </a:xfrm>
+          <a:prstGeom prst="rect">
+            <a:avLst/>
+          </a:prstGeom>
+          <a:noFill/>
+          <a:extLst>
+            <a:ext uri="{909E8E84-426E-40DD-AFC4-6F175D3DCCD1}">
+              <a14:hiddenFill xmlns:a14="http://schemas.microsoft.com/office/drawing/2010/main">
+                <a:solidFill>
+                  <a:srgbClr val="FFFFFF"/>
+                </a:solidFill>
+              </a14:hiddenFill>
+            </a:ext>
+          </a:extLst>
+        </p:spPr>
+      </p:pic>
+    </p:spTree>
+    <p:extLst>
+      <p:ext uri="{BB962C8B-B14F-4D97-AF65-F5344CB8AC3E}">
+        <p14:creationId xmlns:p14="http://schemas.microsoft.com/office/powerpoint/2010/main" val="1982962825"/>
+      </p:ext>
+    </p:extLst>
+  </p:cSld>
+  <p:clrMapOvr>
+    <a:masterClrMapping/>
+  </p:clrMapOvr>
+</p:sld>
+</file>
+
+<file path=ppt/slides/slide12.xml><?xml version="1.0" encoding="utf-8"?>
+<p:sld xmlns:a="http://schemas.openxmlformats.org/drawingml/2006/main" xmlns:r="http://schemas.openxmlformats.org/officeDocument/2006/relationships" xmlns:p="http://schemas.openxmlformats.org/presentationml/2006/main">
+  <p:cSld>
+    <p:spTree>
+      <p:nvGrpSpPr>
+        <p:cNvPr id="1" name=""/>
+        <p:cNvGrpSpPr/>
+        <p:nvPr/>
+      </p:nvGrpSpPr>
+      <p:grpSpPr>
+        <a:xfrm>
+          <a:off x="0" y="0"/>
+          <a:ext cx="0" cy="0"/>
+          <a:chOff x="0" y="0"/>
+          <a:chExt cx="0" cy="0"/>
+        </a:xfrm>
+      </p:grpSpPr>
+      <p:sp>
+        <p:nvSpPr>
+          <p:cNvPr id="2" name="Title 1"/>
+          <p:cNvSpPr>
+            <a:spLocks noGrp="1"/>
+          </p:cNvSpPr>
+          <p:nvPr>
+            <p:ph type="title"/>
+          </p:nvPr>
+        </p:nvSpPr>
+        <p:spPr/>
+        <p:txBody>
+          <a:bodyPr/>
+          <a:lstStyle/>
+          <a:p>
+            <a:r>
+              <a:rPr lang="bg-BG" dirty="0" smtClean="0"/>
+              <a:t>Промяна на информацията в таблица</a:t>
+            </a:r>
+            <a:endParaRPr lang="en-US" dirty="0"/>
+          </a:p>
+        </p:txBody>
+      </p:sp>
+      <p:sp>
+        <p:nvSpPr>
+          <p:cNvPr id="3" name="Content Placeholder 2"/>
+          <p:cNvSpPr>
+            <a:spLocks noGrp="1"/>
+          </p:cNvSpPr>
+          <p:nvPr>
+            <p:ph sz="quarter" idx="13"/>
+          </p:nvPr>
+        </p:nvSpPr>
+        <p:spPr/>
+        <p:txBody>
+          <a:bodyPr/>
+          <a:lstStyle/>
+          <a:p>
+            <a:r>
+              <a:rPr lang="bg-BG" dirty="0" smtClean="0"/>
+              <a:t>Промяната на информацията става с командата </a:t>
+            </a:r>
+            <a:r>
+              <a:rPr lang="en-US" dirty="0" smtClean="0"/>
+              <a:t>update</a:t>
+            </a:r>
+          </a:p>
+          <a:p>
+            <a:r>
+              <a:rPr lang="bg-BG" dirty="0" smtClean="0"/>
+              <a:t>Промяната не трябва да нарушава правило на таблицата</a:t>
+            </a:r>
+          </a:p>
+          <a:p>
+            <a:r>
+              <a:rPr lang="bg-BG" dirty="0" smtClean="0"/>
+              <a:t>Възможна е употребата на клауза </a:t>
+            </a:r>
+            <a:r>
+              <a:rPr lang="en-US" dirty="0" smtClean="0"/>
+              <a:t>where </a:t>
+            </a:r>
+            <a:r>
+              <a:rPr lang="bg-BG" dirty="0" smtClean="0"/>
+              <a:t>която да оказва точно кои елементи ще се променят</a:t>
+            </a:r>
+            <a:endParaRPr lang="en-US" dirty="0"/>
+          </a:p>
+        </p:txBody>
+      </p:sp>
+    </p:spTree>
+    <p:extLst>
+      <p:ext uri="{BB962C8B-B14F-4D97-AF65-F5344CB8AC3E}">
+        <p14:creationId xmlns:p14="http://schemas.microsoft.com/office/powerpoint/2010/main" val="3978805575"/>
+      </p:ext>
+    </p:extLst>
+  </p:cSld>
+  <p:clrMapOvr>
+    <a:masterClrMapping/>
+  </p:clrMapOvr>
+</p:sld>
+</file>
+
+<file path=ppt/slides/slide13.xml><?xml version="1.0" encoding="utf-8"?>
+<p:sld xmlns:a="http://schemas.openxmlformats.org/drawingml/2006/main" xmlns:r="http://schemas.openxmlformats.org/officeDocument/2006/relationships" xmlns:p="http://schemas.openxmlformats.org/presentationml/2006/main">
+  <p:cSld>
+    <p:spTree>
+      <p:nvGrpSpPr>
+        <p:cNvPr id="1" name=""/>
+        <p:cNvGrpSpPr/>
+        <p:nvPr/>
+      </p:nvGrpSpPr>
+      <p:grpSpPr>
+        <a:xfrm>
+          <a:off x="0" y="0"/>
+          <a:ext cx="0" cy="0"/>
+          <a:chOff x="0" y="0"/>
+          <a:chExt cx="0" cy="0"/>
+        </a:xfrm>
+      </p:grpSpPr>
+      <p:sp>
+        <p:nvSpPr>
+          <p:cNvPr id="2" name="Title 1"/>
+          <p:cNvSpPr>
+            <a:spLocks noGrp="1"/>
+          </p:cNvSpPr>
+          <p:nvPr>
+            <p:ph type="title"/>
+          </p:nvPr>
+        </p:nvSpPr>
+        <p:spPr/>
+        <p:txBody>
+          <a:bodyPr/>
+          <a:lstStyle/>
+          <a:p>
+            <a:r>
+              <a:rPr lang="bg-BG" dirty="0"/>
+              <a:t>Промяна на информацията в </a:t>
+            </a:r>
+            <a:r>
+              <a:rPr lang="bg-BG" dirty="0" smtClean="0"/>
+              <a:t>таблица демо</a:t>
+            </a:r>
+            <a:endParaRPr lang="en-US" dirty="0"/>
+          </a:p>
+        </p:txBody>
+      </p:sp>
+      <p:pic>
+        <p:nvPicPr>
+          <p:cNvPr id="5122" name="Picture 2" descr="http://blog.woodylabs.com/wp-content/uploads/2010/12/sql-full-to-sql-compact.png"/>
+          <p:cNvPicPr>
+            <a:picLocks noChangeAspect="1" noChangeArrowheads="1"/>
+          </p:cNvPicPr>
+          <p:nvPr/>
+        </p:nvPicPr>
+        <p:blipFill>
+          <a:blip r:embed="rId2">
+            <a:extLst>
+              <a:ext uri="{28A0092B-C50C-407E-A947-70E740481C1C}">
+                <a14:useLocalDpi xmlns:a14="http://schemas.microsoft.com/office/drawing/2010/main" val="0"/>
+              </a:ext>
+            </a:extLst>
+          </a:blip>
+          <a:srcRect/>
+          <a:stretch>
+            <a:fillRect/>
+          </a:stretch>
+        </p:blipFill>
+        <p:spPr bwMode="auto">
+          <a:xfrm>
+            <a:off x="4061959" y="2214694"/>
+            <a:ext cx="4068082" cy="4068082"/>
+          </a:xfrm>
+          <a:prstGeom prst="rect">
+            <a:avLst/>
+          </a:prstGeom>
+          <a:noFill/>
+          <a:extLst>
+            <a:ext uri="{909E8E84-426E-40DD-AFC4-6F175D3DCCD1}">
+              <a14:hiddenFill xmlns:a14="http://schemas.microsoft.com/office/drawing/2010/main">
+                <a:solidFill>
+                  <a:srgbClr val="FFFFFF"/>
+                </a:solidFill>
+              </a14:hiddenFill>
+            </a:ext>
+          </a:extLst>
+        </p:spPr>
+      </p:pic>
+    </p:spTree>
+    <p:extLst>
+      <p:ext uri="{BB962C8B-B14F-4D97-AF65-F5344CB8AC3E}">
+        <p14:creationId xmlns:p14="http://schemas.microsoft.com/office/powerpoint/2010/main" val="3021910844"/>
+      </p:ext>
+    </p:extLst>
+  </p:cSld>
+  <p:clrMapOvr>
+    <a:masterClrMapping/>
+  </p:clrMapOvr>
+</p:sld>
+</file>
+
+<file path=ppt/slides/slide14.xml><?xml version="1.0" encoding="utf-8"?>
+<p:sld xmlns:a="http://schemas.openxmlformats.org/drawingml/2006/main" xmlns:r="http://schemas.openxmlformats.org/officeDocument/2006/relationships" xmlns:p="http://schemas.openxmlformats.org/presentationml/2006/main">
+  <p:cSld>
+    <p:spTree>
+      <p:nvGrpSpPr>
+        <p:cNvPr id="1" name=""/>
+        <p:cNvGrpSpPr/>
+        <p:nvPr/>
+      </p:nvGrpSpPr>
+      <p:grpSpPr>
+        <a:xfrm>
+          <a:off x="0" y="0"/>
+          <a:ext cx="0" cy="0"/>
+          <a:chOff x="0" y="0"/>
+          <a:chExt cx="0" cy="0"/>
+        </a:xfrm>
+      </p:grpSpPr>
+      <p:sp>
+        <p:nvSpPr>
+          <p:cNvPr id="2" name="Title 1"/>
+          <p:cNvSpPr>
+            <a:spLocks noGrp="1"/>
+          </p:cNvSpPr>
+          <p:nvPr>
+            <p:ph type="title"/>
+          </p:nvPr>
+        </p:nvSpPr>
+        <p:spPr/>
+        <p:txBody>
+          <a:bodyPr/>
+          <a:lstStyle/>
+          <a:p>
+            <a:r>
+              <a:rPr lang="bg-BG" dirty="0" smtClean="0"/>
+              <a:t>задача</a:t>
+            </a:r>
+            <a:endParaRPr lang="en-US" dirty="0"/>
+          </a:p>
+        </p:txBody>
+      </p:sp>
+      <p:sp>
+        <p:nvSpPr>
+          <p:cNvPr id="3" name="Content Placeholder 2"/>
+          <p:cNvSpPr>
+            <a:spLocks noGrp="1"/>
+          </p:cNvSpPr>
+          <p:nvPr>
+            <p:ph sz="quarter" idx="13"/>
+          </p:nvPr>
+        </p:nvSpPr>
+        <p:spPr>
+          <a:xfrm>
+            <a:off x="913774" y="2367092"/>
+            <a:ext cx="10363826" cy="3728908"/>
+          </a:xfrm>
+        </p:spPr>
+        <p:txBody>
+          <a:bodyPr>
+            <a:normAutofit/>
+          </a:bodyPr>
+          <a:lstStyle/>
+          <a:p>
+            <a:pPr marL="0" indent="0">
+              <a:buNone/>
+            </a:pPr>
+            <a:r>
+              <a:rPr lang="bg-BG" dirty="0" smtClean="0"/>
+              <a:t>Създайте 3 таблици за магазин за автомобили на старо както следва:</a:t>
+            </a:r>
+          </a:p>
+          <a:p>
+            <a:pPr marL="0" indent="0">
+              <a:buNone/>
+            </a:pPr>
+            <a:r>
+              <a:rPr lang="bg-BG" dirty="0" smtClean="0"/>
+              <a:t>1) </a:t>
+            </a:r>
+            <a:r>
+              <a:rPr lang="en-US" b="1" dirty="0" smtClean="0"/>
+              <a:t>Brands</a:t>
+            </a:r>
+            <a:r>
+              <a:rPr lang="en-US" dirty="0" smtClean="0"/>
+              <a:t> </a:t>
+            </a:r>
+            <a:r>
+              <a:rPr lang="bg-BG" dirty="0" smtClean="0"/>
+              <a:t>с колони</a:t>
+            </a:r>
+            <a:r>
+              <a:rPr lang="en-US" dirty="0" smtClean="0"/>
+              <a:t>:</a:t>
+            </a:r>
+            <a:r>
+              <a:rPr lang="en-US" dirty="0"/>
+              <a:t> </a:t>
+            </a:r>
+            <a:r>
+              <a:rPr lang="en-US" dirty="0" err="1" smtClean="0"/>
+              <a:t>Brandid</a:t>
+            </a:r>
+            <a:r>
+              <a:rPr lang="en-US" dirty="0" smtClean="0"/>
+              <a:t>, Name</a:t>
+            </a:r>
+            <a:endParaRPr lang="bg-BG" dirty="0" smtClean="0"/>
+          </a:p>
+          <a:p>
+            <a:pPr marL="0" indent="0">
+              <a:buNone/>
+            </a:pPr>
+            <a:r>
+              <a:rPr lang="bg-BG" dirty="0" smtClean="0"/>
+              <a:t>2) </a:t>
+            </a:r>
+            <a:r>
+              <a:rPr lang="en-US" b="1" dirty="0" smtClean="0"/>
+              <a:t>Regions</a:t>
+            </a:r>
+            <a:r>
+              <a:rPr lang="bg-BG" dirty="0" smtClean="0"/>
+              <a:t> с колони</a:t>
+            </a:r>
+            <a:r>
+              <a:rPr lang="en-US" dirty="0" smtClean="0"/>
+              <a:t>: </a:t>
+            </a:r>
+            <a:r>
+              <a:rPr lang="en-US" dirty="0" err="1" smtClean="0"/>
+              <a:t>Regionid</a:t>
+            </a:r>
+            <a:r>
+              <a:rPr lang="en-US" dirty="0" smtClean="0"/>
+              <a:t>, Name, Country</a:t>
+            </a:r>
+          </a:p>
+          <a:p>
+            <a:pPr marL="0" indent="0">
+              <a:buNone/>
+            </a:pPr>
+            <a:r>
+              <a:rPr lang="bg-BG" dirty="0" smtClean="0"/>
+              <a:t>3) </a:t>
+            </a:r>
+            <a:r>
+              <a:rPr lang="en-US" b="1" dirty="0" smtClean="0"/>
+              <a:t>Cars</a:t>
+            </a:r>
+            <a:r>
+              <a:rPr lang="en-US" dirty="0" smtClean="0"/>
+              <a:t> </a:t>
+            </a:r>
+            <a:r>
+              <a:rPr lang="bg-BG" dirty="0" smtClean="0"/>
+              <a:t>с колони: </a:t>
+            </a:r>
+            <a:r>
+              <a:rPr lang="en-US" dirty="0" err="1" smtClean="0"/>
+              <a:t>carid</a:t>
+            </a:r>
+            <a:r>
+              <a:rPr lang="bg-BG" dirty="0" smtClean="0"/>
+              <a:t>, </a:t>
+            </a:r>
+            <a:r>
+              <a:rPr lang="en-US" dirty="0" smtClean="0"/>
+              <a:t>color, year, </a:t>
+            </a:r>
+            <a:r>
+              <a:rPr lang="en-US" dirty="0" err="1" smtClean="0"/>
+              <a:t>brandid</a:t>
+            </a:r>
+            <a:r>
+              <a:rPr lang="en-US" dirty="0" smtClean="0"/>
+              <a:t>, </a:t>
+            </a:r>
+            <a:r>
+              <a:rPr lang="en-US" dirty="0" err="1" smtClean="0"/>
+              <a:t>regionid</a:t>
+            </a:r>
+            <a:endParaRPr lang="en-US" dirty="0" smtClean="0"/>
+          </a:p>
+          <a:p>
+            <a:pPr marL="0" indent="0">
+              <a:buNone/>
+            </a:pPr>
+            <a:r>
+              <a:rPr lang="bg-BG" dirty="0" smtClean="0"/>
+              <a:t>Създайте нужните връзки между таблиците. </a:t>
+            </a:r>
+          </a:p>
+          <a:p>
+            <a:pPr marL="0" indent="0">
+              <a:buNone/>
+            </a:pPr>
+            <a:r>
+              <a:rPr lang="bg-BG" dirty="0" smtClean="0"/>
+              <a:t>Въведете по 3 елемента във всяка таблица с помощта на заявка</a:t>
+            </a:r>
+          </a:p>
+          <a:p>
+            <a:pPr marL="0" indent="0">
+              <a:buNone/>
+            </a:pPr>
+            <a:r>
+              <a:rPr lang="bg-BG" dirty="0" smtClean="0"/>
+              <a:t>Променете 2 от тях с помощта на заявка</a:t>
+            </a:r>
+            <a:endParaRPr lang="en-US" dirty="0" smtClean="0"/>
+          </a:p>
+          <a:p>
+            <a:pPr marL="457200" indent="-457200">
+              <a:buAutoNum type="arabicParenR"/>
+            </a:pPr>
+            <a:endParaRPr lang="en-US" dirty="0" smtClean="0"/>
+          </a:p>
+          <a:p>
+            <a:pPr marL="0" indent="0">
+              <a:buNone/>
+            </a:pPr>
+            <a:endParaRPr lang="en-US" dirty="0"/>
+          </a:p>
+        </p:txBody>
+      </p:sp>
+    </p:spTree>
+    <p:extLst>
+      <p:ext uri="{BB962C8B-B14F-4D97-AF65-F5344CB8AC3E}">
+        <p14:creationId xmlns:p14="http://schemas.microsoft.com/office/powerpoint/2010/main" val="4105433569"/>
+      </p:ext>
+    </p:extLst>
+  </p:cSld>
+  <p:clrMapOvr>
+    <a:masterClrMapping/>
+  </p:clrMapOvr>
+</p:sld>
+</file>
+
+<file path=ppt/slides/slide15.xml><?xml version="1.0" encoding="utf-8"?>
+<p:sld xmlns:a="http://schemas.openxmlformats.org/drawingml/2006/main" xmlns:r="http://schemas.openxmlformats.org/officeDocument/2006/relationships" xmlns:p="http://schemas.openxmlformats.org/presentationml/2006/main">
+  <p:cSld>
+    <p:spTree>
+      <p:nvGrpSpPr>
+        <p:cNvPr id="1" name=""/>
+        <p:cNvGrpSpPr/>
+        <p:nvPr/>
+      </p:nvGrpSpPr>
+      <p:grpSpPr>
+        <a:xfrm>
+          <a:off x="0" y="0"/>
+          <a:ext cx="0" cy="0"/>
+          <a:chOff x="0" y="0"/>
+          <a:chExt cx="0" cy="0"/>
+        </a:xfrm>
+      </p:grpSpPr>
+      <p:sp>
+        <p:nvSpPr>
+          <p:cNvPr id="2" name="Title 1"/>
+          <p:cNvSpPr>
+            <a:spLocks noGrp="1"/>
+          </p:cNvSpPr>
+          <p:nvPr>
+            <p:ph type="title"/>
+          </p:nvPr>
+        </p:nvSpPr>
+        <p:spPr/>
+        <p:txBody>
+          <a:bodyPr/>
+          <a:lstStyle/>
+          <a:p>
+            <a:r>
+              <a:rPr lang="bg-BG" dirty="0" smtClean="0"/>
+              <a:t>Селектиране на данни от т</a:t>
+            </a:r>
+            <a:r>
+              <a:rPr lang="en-US" dirty="0" smtClean="0"/>
+              <a:t>a</a:t>
+            </a:r>
+            <a:r>
+              <a:rPr lang="bg-BG" dirty="0" smtClean="0"/>
+              <a:t>блица</a:t>
+            </a:r>
+            <a:endParaRPr lang="en-US" dirty="0"/>
+          </a:p>
+        </p:txBody>
+      </p:sp>
+      <p:sp>
+        <p:nvSpPr>
+          <p:cNvPr id="3" name="Content Placeholder 2"/>
+          <p:cNvSpPr>
+            <a:spLocks noGrp="1"/>
+          </p:cNvSpPr>
+          <p:nvPr>
+            <p:ph sz="quarter" idx="13"/>
+          </p:nvPr>
+        </p:nvSpPr>
+        <p:spPr/>
+        <p:txBody>
+          <a:bodyPr/>
+          <a:lstStyle/>
+          <a:p>
+            <a:r>
+              <a:rPr lang="bg-BG" dirty="0" smtClean="0"/>
+              <a:t>За извеждане на информация от таблица се използва командата </a:t>
+            </a:r>
+            <a:r>
+              <a:rPr lang="en-US" dirty="0" smtClean="0"/>
+              <a:t>select</a:t>
+            </a:r>
+          </a:p>
+          <a:p>
+            <a:r>
+              <a:rPr lang="en-US" dirty="0" smtClean="0"/>
+              <a:t>Select </a:t>
+            </a:r>
+            <a:r>
+              <a:rPr lang="bg-BG" dirty="0" smtClean="0"/>
+              <a:t>може да се използва с </a:t>
+            </a:r>
+            <a:r>
+              <a:rPr lang="en-US" dirty="0" smtClean="0"/>
+              <a:t>where </a:t>
+            </a:r>
+            <a:r>
+              <a:rPr lang="bg-BG" dirty="0" smtClean="0"/>
+              <a:t>клауза</a:t>
+            </a:r>
+          </a:p>
+          <a:p>
+            <a:r>
+              <a:rPr lang="bg-BG" dirty="0" smtClean="0"/>
+              <a:t>Операцията </a:t>
+            </a:r>
+            <a:r>
+              <a:rPr lang="en-US" dirty="0" smtClean="0"/>
+              <a:t>select </a:t>
+            </a:r>
+            <a:r>
+              <a:rPr lang="bg-BG" dirty="0" smtClean="0"/>
+              <a:t>може да върне множество резултати</a:t>
+            </a:r>
+            <a:endParaRPr lang="en-US" dirty="0"/>
+          </a:p>
+        </p:txBody>
+      </p:sp>
+    </p:spTree>
+    <p:extLst>
+      <p:ext uri="{BB962C8B-B14F-4D97-AF65-F5344CB8AC3E}">
+        <p14:creationId xmlns:p14="http://schemas.microsoft.com/office/powerpoint/2010/main" val="2121170191"/>
+      </p:ext>
+    </p:extLst>
+  </p:cSld>
+  <p:clrMapOvr>
+    <a:masterClrMapping/>
+  </p:clrMapOvr>
+</p:sld>
+</file>
+
+<file path=ppt/slides/slide16.xml><?xml version="1.0" encoding="utf-8"?>
+<p:sld xmlns:a="http://schemas.openxmlformats.org/drawingml/2006/main" xmlns:r="http://schemas.openxmlformats.org/officeDocument/2006/relationships" xmlns:p="http://schemas.openxmlformats.org/presentationml/2006/main">
+  <p:cSld>
+    <p:spTree>
+      <p:nvGrpSpPr>
+        <p:cNvPr id="1" name=""/>
+        <p:cNvGrpSpPr/>
+        <p:nvPr/>
+      </p:nvGrpSpPr>
+      <p:grpSpPr>
+        <a:xfrm>
+          <a:off x="0" y="0"/>
+          <a:ext cx="0" cy="0"/>
+          <a:chOff x="0" y="0"/>
+          <a:chExt cx="0" cy="0"/>
+        </a:xfrm>
+      </p:grpSpPr>
+      <p:sp>
+        <p:nvSpPr>
+          <p:cNvPr id="2" name="Title 1"/>
+          <p:cNvSpPr>
+            <a:spLocks noGrp="1"/>
+          </p:cNvSpPr>
+          <p:nvPr>
+            <p:ph type="title"/>
+          </p:nvPr>
+        </p:nvSpPr>
+        <p:spPr/>
+        <p:txBody>
+          <a:bodyPr/>
+          <a:lstStyle/>
+          <a:p>
+            <a:r>
+              <a:rPr lang="en-US" dirty="0" smtClean="0"/>
+              <a:t>Select </a:t>
+            </a:r>
+            <a:r>
+              <a:rPr lang="bg-BG" dirty="0"/>
+              <a:t>Селектиране на данни от т</a:t>
+            </a:r>
+            <a:r>
+              <a:rPr lang="en-US" dirty="0"/>
+              <a:t>a</a:t>
+            </a:r>
+            <a:r>
+              <a:rPr lang="bg-BG" dirty="0" smtClean="0"/>
+              <a:t>блица</a:t>
+            </a:r>
+            <a:r>
+              <a:rPr lang="en-US" dirty="0" smtClean="0"/>
+              <a:t> </a:t>
+            </a:r>
+            <a:r>
+              <a:rPr lang="bg-BG" dirty="0" smtClean="0"/>
+              <a:t>демо</a:t>
+            </a:r>
+            <a:endParaRPr lang="en-US" dirty="0"/>
+          </a:p>
+        </p:txBody>
+      </p:sp>
+      <p:pic>
+        <p:nvPicPr>
+          <p:cNvPr id="6146" name="Picture 2" descr="http://www.toadworld.com/cfs-file.ashx/__key/communityserver-blogs-components-weblogfiles/00-00-00-00-57/jeffblog051710_2D00_1.gif"/>
+          <p:cNvPicPr>
+            <a:picLocks noChangeAspect="1" noChangeArrowheads="1"/>
+          </p:cNvPicPr>
+          <p:nvPr/>
+        </p:nvPicPr>
+        <p:blipFill>
+          <a:blip r:embed="rId2">
+            <a:extLst>
+              <a:ext uri="{28A0092B-C50C-407E-A947-70E740481C1C}">
+                <a14:useLocalDpi xmlns:a14="http://schemas.microsoft.com/office/drawing/2010/main" val="0"/>
+              </a:ext>
+            </a:extLst>
+          </a:blip>
+          <a:srcRect/>
+          <a:stretch>
+            <a:fillRect/>
+          </a:stretch>
+        </p:blipFill>
+        <p:spPr bwMode="auto">
+          <a:xfrm>
+            <a:off x="2329753" y="2214694"/>
+            <a:ext cx="7532493" cy="4162062"/>
+          </a:xfrm>
+          <a:prstGeom prst="rect">
+            <a:avLst/>
+          </a:prstGeom>
+          <a:noFill/>
+          <a:extLst>
+            <a:ext uri="{909E8E84-426E-40DD-AFC4-6F175D3DCCD1}">
+              <a14:hiddenFill xmlns:a14="http://schemas.microsoft.com/office/drawing/2010/main">
+                <a:solidFill>
+                  <a:srgbClr val="FFFFFF"/>
+                </a:solidFill>
+              </a14:hiddenFill>
+            </a:ext>
+          </a:extLst>
+        </p:spPr>
+      </p:pic>
+    </p:spTree>
+    <p:extLst>
+      <p:ext uri="{BB962C8B-B14F-4D97-AF65-F5344CB8AC3E}">
+        <p14:creationId xmlns:p14="http://schemas.microsoft.com/office/powerpoint/2010/main" val="2163628712"/>
+      </p:ext>
+    </p:extLst>
+  </p:cSld>
+  <p:clrMapOvr>
+    <a:masterClrMapping/>
+  </p:clrMapOvr>
+</p:sld>
+</file>
+
+<file path=ppt/slides/slide17.xml><?xml version="1.0" encoding="utf-8"?>
+<p:sld xmlns:a="http://schemas.openxmlformats.org/drawingml/2006/main" xmlns:r="http://schemas.openxmlformats.org/officeDocument/2006/relationships" xmlns:p="http://schemas.openxmlformats.org/presentationml/2006/main">
+  <p:cSld>
+    <p:spTree>
+      <p:nvGrpSpPr>
+        <p:cNvPr id="1" name=""/>
+        <p:cNvGrpSpPr/>
+        <p:nvPr/>
+      </p:nvGrpSpPr>
+      <p:grpSpPr>
+        <a:xfrm>
+          <a:off x="0" y="0"/>
+          <a:ext cx="0" cy="0"/>
+          <a:chOff x="0" y="0"/>
+          <a:chExt cx="0" cy="0"/>
+        </a:xfrm>
+      </p:grpSpPr>
+      <p:sp>
+        <p:nvSpPr>
+          <p:cNvPr id="2" name="Title 1"/>
+          <p:cNvSpPr>
+            <a:spLocks noGrp="1"/>
+          </p:cNvSpPr>
+          <p:nvPr>
+            <p:ph type="title"/>
+          </p:nvPr>
+        </p:nvSpPr>
+        <p:spPr/>
+        <p:txBody>
+          <a:bodyPr/>
+          <a:lstStyle/>
+          <a:p>
+            <a:r>
+              <a:rPr lang="bg-BG" dirty="0" smtClean="0"/>
+              <a:t>Възможности на </a:t>
+            </a:r>
+            <a:r>
+              <a:rPr lang="en-US" dirty="0" smtClean="0"/>
+              <a:t>where </a:t>
+            </a:r>
+            <a:r>
+              <a:rPr lang="bg-BG" dirty="0" smtClean="0"/>
+              <a:t>клаузата</a:t>
+            </a:r>
+            <a:endParaRPr lang="en-US" dirty="0"/>
+          </a:p>
+        </p:txBody>
+      </p:sp>
+      <p:sp>
+        <p:nvSpPr>
+          <p:cNvPr id="3" name="Content Placeholder 2"/>
+          <p:cNvSpPr>
+            <a:spLocks noGrp="1"/>
+          </p:cNvSpPr>
+          <p:nvPr>
+            <p:ph sz="quarter" idx="13"/>
+          </p:nvPr>
+        </p:nvSpPr>
+        <p:spPr/>
+        <p:txBody>
+          <a:bodyPr/>
+          <a:lstStyle/>
+          <a:p>
+            <a:r>
+              <a:rPr lang="bg-BG" dirty="0" smtClean="0"/>
+              <a:t>Може да включваме логическо </a:t>
+            </a:r>
+            <a:r>
+              <a:rPr lang="bg-BG" dirty="0"/>
+              <a:t>и</a:t>
+            </a:r>
+            <a:r>
+              <a:rPr lang="en-US" dirty="0" smtClean="0"/>
+              <a:t> </a:t>
+            </a:r>
+            <a:r>
+              <a:rPr lang="bg-BG" dirty="0" smtClean="0"/>
+              <a:t>в </a:t>
+            </a:r>
+            <a:r>
+              <a:rPr lang="en-US" dirty="0" smtClean="0"/>
+              <a:t>where </a:t>
+            </a:r>
+            <a:r>
+              <a:rPr lang="bg-BG" dirty="0" smtClean="0"/>
+              <a:t>клаузата</a:t>
+            </a:r>
+          </a:p>
+          <a:p>
+            <a:r>
+              <a:rPr lang="bg-BG" dirty="0"/>
+              <a:t>Може да включваме логическо </a:t>
+            </a:r>
+            <a:r>
+              <a:rPr lang="bg-BG" dirty="0" smtClean="0"/>
+              <a:t>или в </a:t>
+            </a:r>
+            <a:r>
+              <a:rPr lang="en-US" dirty="0"/>
+              <a:t>where </a:t>
+            </a:r>
+            <a:r>
+              <a:rPr lang="bg-BG" dirty="0" smtClean="0"/>
+              <a:t>клаузата</a:t>
+            </a:r>
+          </a:p>
+          <a:p>
+            <a:r>
+              <a:rPr lang="bg-BG" dirty="0" smtClean="0"/>
+              <a:t>Може да включваме логическо не в </a:t>
+            </a:r>
+            <a:r>
+              <a:rPr lang="en-US" dirty="0" smtClean="0"/>
+              <a:t>where </a:t>
+            </a:r>
+            <a:r>
+              <a:rPr lang="bg-BG" dirty="0" err="1" smtClean="0"/>
+              <a:t>калузата</a:t>
+            </a:r>
+            <a:endParaRPr lang="en-US" dirty="0"/>
+          </a:p>
+          <a:p>
+            <a:endParaRPr lang="en-US" dirty="0"/>
+          </a:p>
+        </p:txBody>
+      </p:sp>
+    </p:spTree>
+    <p:extLst>
+      <p:ext uri="{BB962C8B-B14F-4D97-AF65-F5344CB8AC3E}">
+        <p14:creationId xmlns:p14="http://schemas.microsoft.com/office/powerpoint/2010/main" val="1590420452"/>
+      </p:ext>
+    </p:extLst>
+  </p:cSld>
+  <p:clrMapOvr>
+    <a:masterClrMapping/>
+  </p:clrMapOvr>
+</p:sld>
+</file>
+
+<file path=ppt/slides/slide18.xml><?xml version="1.0" encoding="utf-8"?>
+<p:sld xmlns:a="http://schemas.openxmlformats.org/drawingml/2006/main" xmlns:r="http://schemas.openxmlformats.org/officeDocument/2006/relationships" xmlns:p="http://schemas.openxmlformats.org/presentationml/2006/main">
+  <p:cSld>
+    <p:spTree>
+      <p:nvGrpSpPr>
+        <p:cNvPr id="1" name=""/>
+        <p:cNvGrpSpPr/>
+        <p:nvPr/>
+      </p:nvGrpSpPr>
+      <p:grpSpPr>
+        <a:xfrm>
+          <a:off x="0" y="0"/>
+          <a:ext cx="0" cy="0"/>
+          <a:chOff x="0" y="0"/>
+          <a:chExt cx="0" cy="0"/>
+        </a:xfrm>
+      </p:grpSpPr>
+      <p:sp>
+        <p:nvSpPr>
+          <p:cNvPr id="2" name="Title 1"/>
+          <p:cNvSpPr>
+            <a:spLocks noGrp="1"/>
+          </p:cNvSpPr>
+          <p:nvPr>
+            <p:ph type="title"/>
+          </p:nvPr>
+        </p:nvSpPr>
+        <p:spPr/>
+        <p:txBody>
+          <a:bodyPr/>
+          <a:lstStyle/>
+          <a:p>
+            <a:r>
+              <a:rPr lang="bg-BG" dirty="0"/>
+              <a:t>Възможности на </a:t>
+            </a:r>
+            <a:r>
+              <a:rPr lang="en-US" dirty="0"/>
+              <a:t>where </a:t>
+            </a:r>
+            <a:r>
+              <a:rPr lang="bg-BG" dirty="0" smtClean="0"/>
+              <a:t>клаузата демо</a:t>
+            </a:r>
+            <a:endParaRPr lang="en-US" dirty="0"/>
+          </a:p>
+        </p:txBody>
+      </p:sp>
+      <p:pic>
+        <p:nvPicPr>
+          <p:cNvPr id="7170" name="Picture 2" descr="http://mertkanelpeze.com/wp-content/uploads/2012/03/where-are-you-productive-300x199.jpg"/>
+          <p:cNvPicPr>
+            <a:picLocks noChangeAspect="1" noChangeArrowheads="1"/>
+          </p:cNvPicPr>
+          <p:nvPr/>
+        </p:nvPicPr>
+        <p:blipFill>
+          <a:blip r:embed="rId2">
+            <a:extLst>
+              <a:ext uri="{28A0092B-C50C-407E-A947-70E740481C1C}">
+                <a14:useLocalDpi xmlns:a14="http://schemas.microsoft.com/office/drawing/2010/main" val="0"/>
+              </a:ext>
+            </a:extLst>
+          </a:blip>
+          <a:srcRect/>
+          <a:stretch>
+            <a:fillRect/>
+          </a:stretch>
+        </p:blipFill>
+        <p:spPr bwMode="auto">
+          <a:xfrm>
+            <a:off x="3234644" y="2214694"/>
+            <a:ext cx="5722711" cy="3796067"/>
+          </a:xfrm>
+          <a:prstGeom prst="rect">
+            <a:avLst/>
+          </a:prstGeom>
+          <a:noFill/>
+          <a:extLst>
+            <a:ext uri="{909E8E84-426E-40DD-AFC4-6F175D3DCCD1}">
+              <a14:hiddenFill xmlns:a14="http://schemas.microsoft.com/office/drawing/2010/main">
+                <a:solidFill>
+                  <a:srgbClr val="FFFFFF"/>
+                </a:solidFill>
+              </a14:hiddenFill>
+            </a:ext>
+          </a:extLst>
+        </p:spPr>
+      </p:pic>
+    </p:spTree>
+    <p:extLst>
+      <p:ext uri="{BB962C8B-B14F-4D97-AF65-F5344CB8AC3E}">
+        <p14:creationId xmlns:p14="http://schemas.microsoft.com/office/powerpoint/2010/main" val="2894183935"/>
+      </p:ext>
+    </p:extLst>
+  </p:cSld>
+  <p:clrMapOvr>
+    <a:masterClrMapping/>
+  </p:clrMapOvr>
+</p:sld>
+</file>
+
+<file path=ppt/slides/slide19.xml><?xml version="1.0" encoding="utf-8"?>
+<p:sld xmlns:a="http://schemas.openxmlformats.org/drawingml/2006/main" xmlns:r="http://schemas.openxmlformats.org/officeDocument/2006/relationships" xmlns:p="http://schemas.openxmlformats.org/presentationml/2006/main">
+  <p:cSld>
+    <p:spTree>
+      <p:nvGrpSpPr>
+        <p:cNvPr id="1" name=""/>
+        <p:cNvGrpSpPr/>
+        <p:nvPr/>
+      </p:nvGrpSpPr>
+      <p:grpSpPr>
+        <a:xfrm>
+          <a:off x="0" y="0"/>
+          <a:ext cx="0" cy="0"/>
+          <a:chOff x="0" y="0"/>
+          <a:chExt cx="0" cy="0"/>
+        </a:xfrm>
+      </p:grpSpPr>
+      <p:sp>
+        <p:nvSpPr>
+          <p:cNvPr id="2" name="Title 1"/>
+          <p:cNvSpPr>
+            <a:spLocks noGrp="1"/>
+          </p:cNvSpPr>
+          <p:nvPr>
+            <p:ph type="title"/>
+          </p:nvPr>
+        </p:nvSpPr>
+        <p:spPr/>
+        <p:txBody>
+          <a:bodyPr/>
+          <a:lstStyle/>
+          <a:p>
+            <a:r>
+              <a:rPr lang="bg-BG" dirty="0" smtClean="0"/>
+              <a:t>Използване на </a:t>
+            </a:r>
+            <a:r>
+              <a:rPr lang="en-US" b="1" dirty="0" smtClean="0"/>
+              <a:t>like</a:t>
+            </a:r>
+            <a:r>
+              <a:rPr lang="en-US" dirty="0" smtClean="0"/>
+              <a:t> </a:t>
+            </a:r>
+            <a:r>
+              <a:rPr lang="bg-BG" dirty="0" smtClean="0"/>
+              <a:t>в </a:t>
+            </a:r>
+            <a:r>
+              <a:rPr lang="en-US" b="1" dirty="0" smtClean="0"/>
+              <a:t>where</a:t>
+            </a:r>
+            <a:r>
+              <a:rPr lang="en-US" dirty="0" smtClean="0"/>
+              <a:t> </a:t>
+            </a:r>
+            <a:r>
+              <a:rPr lang="bg-BG" dirty="0" smtClean="0"/>
+              <a:t>клауза</a:t>
+            </a:r>
+            <a:endParaRPr lang="en-US" dirty="0"/>
+          </a:p>
+        </p:txBody>
+      </p:sp>
+      <p:sp>
+        <p:nvSpPr>
+          <p:cNvPr id="3" name="Content Placeholder 2"/>
+          <p:cNvSpPr>
+            <a:spLocks noGrp="1"/>
+          </p:cNvSpPr>
+          <p:nvPr>
+            <p:ph sz="quarter" idx="13"/>
+          </p:nvPr>
+        </p:nvSpPr>
+        <p:spPr/>
+        <p:txBody>
+          <a:bodyPr/>
+          <a:lstStyle/>
+          <a:p>
+            <a:r>
+              <a:rPr lang="bg-BG" dirty="0" err="1" smtClean="0"/>
+              <a:t>КОгато</a:t>
+            </a:r>
+            <a:r>
+              <a:rPr lang="bg-BG" dirty="0" smtClean="0"/>
+              <a:t> работим с бази данни често ни се налага да проверим дали текст съдържа определена дума или поредица от символи</a:t>
+            </a:r>
+          </a:p>
+          <a:p>
+            <a:r>
+              <a:rPr lang="bg-BG" dirty="0" smtClean="0"/>
+              <a:t>Проверката дали текст съдържа поредица от символи става с помощта на </a:t>
+            </a:r>
+            <a:r>
+              <a:rPr lang="en-US" dirty="0" smtClean="0"/>
+              <a:t>like</a:t>
+            </a:r>
+          </a:p>
+          <a:p>
+            <a:r>
+              <a:rPr lang="bg-BG" dirty="0" smtClean="0"/>
+              <a:t>Когато съставяме </a:t>
+            </a:r>
+            <a:r>
+              <a:rPr lang="en-US" dirty="0" smtClean="0"/>
+              <a:t>where </a:t>
+            </a:r>
+            <a:r>
+              <a:rPr lang="bg-BG" dirty="0" smtClean="0"/>
+              <a:t>клауза с </a:t>
+            </a:r>
+            <a:r>
+              <a:rPr lang="en-US" dirty="0" smtClean="0"/>
+              <a:t>Like </a:t>
+            </a:r>
+            <a:r>
+              <a:rPr lang="bg-BG" dirty="0" smtClean="0"/>
+              <a:t>Може да проверим дали даден текст започва, завършва или съдържа определена поредица от символи с помощта на символа %</a:t>
+            </a:r>
+            <a:endParaRPr lang="en-US" dirty="0"/>
+          </a:p>
+        </p:txBody>
+      </p:sp>
+    </p:spTree>
+    <p:extLst>
+      <p:ext uri="{BB962C8B-B14F-4D97-AF65-F5344CB8AC3E}">
+        <p14:creationId xmlns:p14="http://schemas.microsoft.com/office/powerpoint/2010/main" val="2795855756"/>
+      </p:ext>
+    </p:extLst>
+  </p:cSld>
+  <p:clrMapOvr>
+    <a:masterClrMapping/>
+  </p:clrMapOvr>
+</p:sld>
+</file>
+
 <file path=ppt/slides/slide2.xml><?xml version="1.0" encoding="utf-8"?>
 <p:sld xmlns:a="http://schemas.openxmlformats.org/drawingml/2006/main" xmlns:r="http://schemas.openxmlformats.org/officeDocument/2006/relationships" xmlns:p="http://schemas.openxmlformats.org/presentationml/2006/main">
   <p:cSld>
@@ -6603,16 +7864,11 @@
               <a:rPr lang="bg-BG" dirty="0" smtClean="0"/>
               <a:t>База данни означава количество информация организирана по начин по който компютърен език или програма може лесно да управлява тези данни</a:t>
             </a:r>
-            <a:endParaRPr lang="bg-BG" dirty="0" smtClean="0"/>
-          </a:p>
-          <a:p>
-            <a:r>
-              <a:rPr lang="bg-BG" dirty="0" smtClean="0"/>
-              <a:t>Управляват информацията по-ефективно от </a:t>
-            </a:r>
-            <a:r>
-              <a:rPr lang="bg-BG" dirty="0" smtClean="0"/>
-              <a:t>програмен код</a:t>
+          </a:p>
+          <a:p>
+            <a:r>
+              <a:rPr lang="bg-BG" dirty="0" smtClean="0"/>
+              <a:t>Управляват информацията по-ефективно от програмен код</a:t>
             </a:r>
           </a:p>
           <a:p>
@@ -6653,6 +7909,438 @@
     <p:extLst>
       <p:ext uri="{BB962C8B-B14F-4D97-AF65-F5344CB8AC3E}">
         <p14:creationId xmlns:p14="http://schemas.microsoft.com/office/powerpoint/2010/main" val="2755244757"/>
+      </p:ext>
+    </p:extLst>
+  </p:cSld>
+  <p:clrMapOvr>
+    <a:masterClrMapping/>
+  </p:clrMapOvr>
+</p:sld>
+</file>
+
+<file path=ppt/slides/slide20.xml><?xml version="1.0" encoding="utf-8"?>
+<p:sld xmlns:a="http://schemas.openxmlformats.org/drawingml/2006/main" xmlns:r="http://schemas.openxmlformats.org/officeDocument/2006/relationships" xmlns:p="http://schemas.openxmlformats.org/presentationml/2006/main">
+  <p:cSld>
+    <p:spTree>
+      <p:nvGrpSpPr>
+        <p:cNvPr id="1" name=""/>
+        <p:cNvGrpSpPr/>
+        <p:nvPr/>
+      </p:nvGrpSpPr>
+      <p:grpSpPr>
+        <a:xfrm>
+          <a:off x="0" y="0"/>
+          <a:ext cx="0" cy="0"/>
+          <a:chOff x="0" y="0"/>
+          <a:chExt cx="0" cy="0"/>
+        </a:xfrm>
+      </p:grpSpPr>
+      <p:sp>
+        <p:nvSpPr>
+          <p:cNvPr id="2" name="Title 1"/>
+          <p:cNvSpPr>
+            <a:spLocks noGrp="1"/>
+          </p:cNvSpPr>
+          <p:nvPr>
+            <p:ph type="title"/>
+          </p:nvPr>
+        </p:nvSpPr>
+        <p:spPr/>
+        <p:txBody>
+          <a:bodyPr/>
+          <a:lstStyle/>
+          <a:p>
+            <a:r>
+              <a:rPr lang="bg-BG" dirty="0"/>
+              <a:t>Използване на </a:t>
+            </a:r>
+            <a:r>
+              <a:rPr lang="en-US" b="1" dirty="0"/>
+              <a:t>like</a:t>
+            </a:r>
+            <a:r>
+              <a:rPr lang="en-US" dirty="0"/>
+              <a:t> </a:t>
+            </a:r>
+            <a:r>
+              <a:rPr lang="bg-BG" dirty="0"/>
+              <a:t>в </a:t>
+            </a:r>
+            <a:r>
+              <a:rPr lang="en-US" b="1" dirty="0"/>
+              <a:t>where</a:t>
+            </a:r>
+            <a:r>
+              <a:rPr lang="en-US" dirty="0"/>
+              <a:t> </a:t>
+            </a:r>
+            <a:r>
+              <a:rPr lang="bg-BG" dirty="0" smtClean="0"/>
+              <a:t>клауза демо</a:t>
+            </a:r>
+            <a:endParaRPr lang="en-US" dirty="0"/>
+          </a:p>
+        </p:txBody>
+      </p:sp>
+      <p:pic>
+        <p:nvPicPr>
+          <p:cNvPr id="8194" name="Picture 2" descr="https://encrypted-tbn2.gstatic.com/images?q=tbn:ANd9GcQBcr2rZdNdVdb0XnVU7ErLmSru5y04D1DdWgIpiogyZcewyFXfGA"/>
+          <p:cNvPicPr>
+            <a:picLocks noChangeAspect="1" noChangeArrowheads="1"/>
+          </p:cNvPicPr>
+          <p:nvPr/>
+        </p:nvPicPr>
+        <p:blipFill>
+          <a:blip r:embed="rId2">
+            <a:extLst>
+              <a:ext uri="{28A0092B-C50C-407E-A947-70E740481C1C}">
+                <a14:useLocalDpi xmlns:a14="http://schemas.microsoft.com/office/drawing/2010/main" val="0"/>
+              </a:ext>
+            </a:extLst>
+          </a:blip>
+          <a:srcRect/>
+          <a:stretch>
+            <a:fillRect/>
+          </a:stretch>
+        </p:blipFill>
+        <p:spPr bwMode="auto">
+          <a:xfrm>
+            <a:off x="3739742" y="2214694"/>
+            <a:ext cx="4712516" cy="3529840"/>
+          </a:xfrm>
+          <a:prstGeom prst="rect">
+            <a:avLst/>
+          </a:prstGeom>
+          <a:noFill/>
+          <a:extLst>
+            <a:ext uri="{909E8E84-426E-40DD-AFC4-6F175D3DCCD1}">
+              <a14:hiddenFill xmlns:a14="http://schemas.microsoft.com/office/drawing/2010/main">
+                <a:solidFill>
+                  <a:srgbClr val="FFFFFF"/>
+                </a:solidFill>
+              </a14:hiddenFill>
+            </a:ext>
+          </a:extLst>
+        </p:spPr>
+      </p:pic>
+    </p:spTree>
+    <p:extLst>
+      <p:ext uri="{BB962C8B-B14F-4D97-AF65-F5344CB8AC3E}">
+        <p14:creationId xmlns:p14="http://schemas.microsoft.com/office/powerpoint/2010/main" val="3876861920"/>
+      </p:ext>
+    </p:extLst>
+  </p:cSld>
+  <p:clrMapOvr>
+    <a:masterClrMapping/>
+  </p:clrMapOvr>
+</p:sld>
+</file>
+
+<file path=ppt/slides/slide21.xml><?xml version="1.0" encoding="utf-8"?>
+<p:sld xmlns:a="http://schemas.openxmlformats.org/drawingml/2006/main" xmlns:r="http://schemas.openxmlformats.org/officeDocument/2006/relationships" xmlns:p="http://schemas.openxmlformats.org/presentationml/2006/main">
+  <p:cSld>
+    <p:spTree>
+      <p:nvGrpSpPr>
+        <p:cNvPr id="1" name=""/>
+        <p:cNvGrpSpPr/>
+        <p:nvPr/>
+      </p:nvGrpSpPr>
+      <p:grpSpPr>
+        <a:xfrm>
+          <a:off x="0" y="0"/>
+          <a:ext cx="0" cy="0"/>
+          <a:chOff x="0" y="0"/>
+          <a:chExt cx="0" cy="0"/>
+        </a:xfrm>
+      </p:grpSpPr>
+      <p:sp>
+        <p:nvSpPr>
+          <p:cNvPr id="2" name="Title 1"/>
+          <p:cNvSpPr>
+            <a:spLocks noGrp="1"/>
+          </p:cNvSpPr>
+          <p:nvPr>
+            <p:ph type="title"/>
+          </p:nvPr>
+        </p:nvSpPr>
+        <p:spPr/>
+        <p:txBody>
+          <a:bodyPr/>
+          <a:lstStyle/>
+          <a:p>
+            <a:r>
+              <a:rPr lang="bg-BG" dirty="0" smtClean="0"/>
+              <a:t>Подреждане на резултатите от заявка</a:t>
+            </a:r>
+            <a:endParaRPr lang="en-US" dirty="0"/>
+          </a:p>
+        </p:txBody>
+      </p:sp>
+      <p:sp>
+        <p:nvSpPr>
+          <p:cNvPr id="3" name="Content Placeholder 2"/>
+          <p:cNvSpPr>
+            <a:spLocks noGrp="1"/>
+          </p:cNvSpPr>
+          <p:nvPr>
+            <p:ph sz="quarter" idx="13"/>
+          </p:nvPr>
+        </p:nvSpPr>
+        <p:spPr/>
+        <p:txBody>
+          <a:bodyPr/>
+          <a:lstStyle/>
+          <a:p>
+            <a:r>
+              <a:rPr lang="bg-BG" dirty="0" smtClean="0"/>
+              <a:t>Подреждането на данните става по определена колона с помощта на </a:t>
+            </a:r>
+            <a:r>
+              <a:rPr lang="en-US" dirty="0" smtClean="0"/>
+              <a:t>order by</a:t>
+            </a:r>
+          </a:p>
+          <a:p>
+            <a:r>
+              <a:rPr lang="bg-BG" dirty="0" smtClean="0"/>
+              <a:t>Резултатите могат да се подредят както в низходящ така и възходящ ред</a:t>
+            </a:r>
+          </a:p>
+          <a:p>
+            <a:r>
+              <a:rPr lang="en-US" dirty="0" smtClean="0"/>
+              <a:t>Order by </a:t>
+            </a:r>
+            <a:r>
+              <a:rPr lang="bg-BG" dirty="0" smtClean="0"/>
+              <a:t>заема място след </a:t>
+            </a:r>
+            <a:r>
+              <a:rPr lang="en-US" dirty="0" smtClean="0"/>
+              <a:t>where </a:t>
+            </a:r>
+            <a:r>
+              <a:rPr lang="bg-BG" dirty="0" smtClean="0"/>
+              <a:t> в заявката</a:t>
+            </a:r>
+            <a:endParaRPr lang="en-US" dirty="0"/>
+          </a:p>
+        </p:txBody>
+      </p:sp>
+    </p:spTree>
+    <p:extLst>
+      <p:ext uri="{BB962C8B-B14F-4D97-AF65-F5344CB8AC3E}">
+        <p14:creationId xmlns:p14="http://schemas.microsoft.com/office/powerpoint/2010/main" val="2030455199"/>
+      </p:ext>
+    </p:extLst>
+  </p:cSld>
+  <p:clrMapOvr>
+    <a:masterClrMapping/>
+  </p:clrMapOvr>
+</p:sld>
+</file>
+
+<file path=ppt/slides/slide22.xml><?xml version="1.0" encoding="utf-8"?>
+<p:sld xmlns:a="http://schemas.openxmlformats.org/drawingml/2006/main" xmlns:r="http://schemas.openxmlformats.org/officeDocument/2006/relationships" xmlns:p="http://schemas.openxmlformats.org/presentationml/2006/main">
+  <p:cSld>
+    <p:spTree>
+      <p:nvGrpSpPr>
+        <p:cNvPr id="1" name=""/>
+        <p:cNvGrpSpPr/>
+        <p:nvPr/>
+      </p:nvGrpSpPr>
+      <p:grpSpPr>
+        <a:xfrm>
+          <a:off x="0" y="0"/>
+          <a:ext cx="0" cy="0"/>
+          <a:chOff x="0" y="0"/>
+          <a:chExt cx="0" cy="0"/>
+        </a:xfrm>
+      </p:grpSpPr>
+      <p:sp>
+        <p:nvSpPr>
+          <p:cNvPr id="2" name="Title 1"/>
+          <p:cNvSpPr>
+            <a:spLocks noGrp="1"/>
+          </p:cNvSpPr>
+          <p:nvPr>
+            <p:ph type="title"/>
+          </p:nvPr>
+        </p:nvSpPr>
+        <p:spPr/>
+        <p:txBody>
+          <a:bodyPr/>
+          <a:lstStyle/>
+          <a:p>
+            <a:r>
+              <a:rPr lang="bg-BG" dirty="0" smtClean="0"/>
+              <a:t>задача</a:t>
+            </a:r>
+            <a:endParaRPr lang="en-US" dirty="0"/>
+          </a:p>
+        </p:txBody>
+      </p:sp>
+      <p:sp>
+        <p:nvSpPr>
+          <p:cNvPr id="3" name="Content Placeholder 2"/>
+          <p:cNvSpPr>
+            <a:spLocks noGrp="1"/>
+          </p:cNvSpPr>
+          <p:nvPr>
+            <p:ph sz="quarter" idx="13"/>
+          </p:nvPr>
+        </p:nvSpPr>
+        <p:spPr/>
+        <p:txBody>
+          <a:bodyPr/>
+          <a:lstStyle/>
+          <a:p>
+            <a:r>
+              <a:rPr lang="bg-BG" dirty="0" smtClean="0"/>
+              <a:t>Използвайте базата данни </a:t>
+            </a:r>
+            <a:r>
+              <a:rPr lang="en-US" dirty="0" smtClean="0"/>
+              <a:t>world </a:t>
+            </a:r>
+            <a:r>
+              <a:rPr lang="bg-BG" dirty="0" smtClean="0"/>
+              <a:t>И направете заявка която извежда всички страни които се намират в </a:t>
+            </a:r>
+            <a:r>
+              <a:rPr lang="bg-BG" dirty="0" err="1" smtClean="0"/>
+              <a:t>азия</a:t>
+            </a:r>
+            <a:r>
+              <a:rPr lang="bg-BG" dirty="0" smtClean="0"/>
+              <a:t> или южна </a:t>
+            </a:r>
+            <a:r>
+              <a:rPr lang="bg-BG" dirty="0" err="1" smtClean="0"/>
+              <a:t>америка</a:t>
+            </a:r>
+            <a:r>
+              <a:rPr lang="bg-BG" dirty="0" smtClean="0"/>
+              <a:t> и имат площ по-малка от </a:t>
+            </a:r>
+            <a:r>
+              <a:rPr lang="en-US" dirty="0" smtClean="0"/>
+              <a:t>1</a:t>
+            </a:r>
+            <a:r>
+              <a:rPr lang="bg-BG" dirty="0" smtClean="0"/>
+              <a:t>3</a:t>
+            </a:r>
+            <a:r>
+              <a:rPr lang="en-US" dirty="0" smtClean="0"/>
+              <a:t>000</a:t>
+            </a:r>
+            <a:r>
+              <a:rPr lang="bg-BG" dirty="0" smtClean="0"/>
+              <a:t> км</a:t>
+            </a:r>
+            <a:endParaRPr lang="en-US" dirty="0"/>
+          </a:p>
+        </p:txBody>
+      </p:sp>
+    </p:spTree>
+    <p:extLst>
+      <p:ext uri="{BB962C8B-B14F-4D97-AF65-F5344CB8AC3E}">
+        <p14:creationId xmlns:p14="http://schemas.microsoft.com/office/powerpoint/2010/main" val="2298502768"/>
+      </p:ext>
+    </p:extLst>
+  </p:cSld>
+  <p:clrMapOvr>
+    <a:masterClrMapping/>
+  </p:clrMapOvr>
+</p:sld>
+</file>
+
+<file path=ppt/slides/slide23.xml><?xml version="1.0" encoding="utf-8"?>
+<p:sld xmlns:a="http://schemas.openxmlformats.org/drawingml/2006/main" xmlns:r="http://schemas.openxmlformats.org/officeDocument/2006/relationships" xmlns:p="http://schemas.openxmlformats.org/presentationml/2006/main">
+  <p:cSld>
+    <p:spTree>
+      <p:nvGrpSpPr>
+        <p:cNvPr id="1" name=""/>
+        <p:cNvGrpSpPr/>
+        <p:nvPr/>
+      </p:nvGrpSpPr>
+      <p:grpSpPr>
+        <a:xfrm>
+          <a:off x="0" y="0"/>
+          <a:ext cx="0" cy="0"/>
+          <a:chOff x="0" y="0"/>
+          <a:chExt cx="0" cy="0"/>
+        </a:xfrm>
+      </p:grpSpPr>
+      <p:sp>
+        <p:nvSpPr>
+          <p:cNvPr id="2" name="Title 1"/>
+          <p:cNvSpPr>
+            <a:spLocks noGrp="1"/>
+          </p:cNvSpPr>
+          <p:nvPr>
+            <p:ph type="title"/>
+          </p:nvPr>
+        </p:nvSpPr>
+        <p:spPr/>
+        <p:txBody>
+          <a:bodyPr/>
+          <a:lstStyle/>
+          <a:p>
+            <a:r>
+              <a:rPr lang="bg-BG" dirty="0" smtClean="0"/>
+              <a:t>Въпроси</a:t>
+            </a:r>
+            <a:endParaRPr lang="en-US" dirty="0"/>
+          </a:p>
+        </p:txBody>
+      </p:sp>
+      <p:pic>
+        <p:nvPicPr>
+          <p:cNvPr id="9218" name="Picture 2" descr="http://allpropackingandmoving.com/wp-content/uploads/2014/06/ask-the-right-questions.jpg"/>
+          <p:cNvPicPr>
+            <a:picLocks noChangeAspect="1" noChangeArrowheads="1"/>
+          </p:cNvPicPr>
+          <p:nvPr/>
+        </p:nvPicPr>
+        <p:blipFill>
+          <a:blip r:embed="rId2" cstate="print">
+            <a:extLst>
+              <a:ext uri="{28A0092B-C50C-407E-A947-70E740481C1C}">
+                <a14:useLocalDpi xmlns:a14="http://schemas.microsoft.com/office/drawing/2010/main" val="0"/>
+              </a:ext>
+            </a:extLst>
+          </a:blip>
+          <a:srcRect/>
+          <a:stretch>
+            <a:fillRect/>
+          </a:stretch>
+        </p:blipFill>
+        <p:spPr bwMode="auto">
+          <a:xfrm>
+            <a:off x="4165232" y="2214694"/>
+            <a:ext cx="3861536" cy="3861536"/>
+          </a:xfrm>
+          <a:prstGeom prst="rect">
+            <a:avLst/>
+          </a:prstGeom>
+          <a:noFill/>
+          <a:extLst>
+            <a:ext uri="{909E8E84-426E-40DD-AFC4-6F175D3DCCD1}">
+              <a14:hiddenFill xmlns:a14="http://schemas.microsoft.com/office/drawing/2010/main">
+                <a:solidFill>
+                  <a:srgbClr val="FFFFFF"/>
+                </a:solidFill>
+              </a14:hiddenFill>
+            </a:ext>
+          </a:extLst>
+        </p:spPr>
+      </p:pic>
+    </p:spTree>
+    <p:extLst>
+      <p:ext uri="{BB962C8B-B14F-4D97-AF65-F5344CB8AC3E}">
+        <p14:creationId xmlns:p14="http://schemas.microsoft.com/office/powerpoint/2010/main" val="3188888295"/>
       </p:ext>
     </p:extLst>
   </p:cSld>
@@ -6700,15 +8388,7 @@
             </a:r>
             <a:r>
               <a:rPr lang="bg-BG" dirty="0" smtClean="0"/>
-              <a:t> </a:t>
-            </a:r>
-            <a:r>
-              <a:rPr lang="bg-BG" dirty="0" smtClean="0"/>
-              <a:t>бази </a:t>
-            </a:r>
-            <a:r>
-              <a:rPr lang="bg-BG" dirty="0" smtClean="0"/>
-              <a:t>данни</a:t>
+              <a:t> бази данни</a:t>
             </a:r>
             <a:endParaRPr lang="en-US" dirty="0"/>
           </a:p>
@@ -6762,11 +8442,7 @@
           <a:p>
             <a:r>
               <a:rPr lang="bg-BG" dirty="0" smtClean="0"/>
-              <a:t>Обектно </a:t>
-            </a:r>
-            <a:r>
-              <a:rPr lang="bg-BG" dirty="0" smtClean="0"/>
-              <a:t>ориентирани </a:t>
+              <a:t>Обектно ориентирани </a:t>
             </a:r>
             <a:endParaRPr lang="en-US" dirty="0"/>
           </a:p>
@@ -6776,6 +8452,704 @@
     <p:extLst>
       <p:ext uri="{BB962C8B-B14F-4D97-AF65-F5344CB8AC3E}">
         <p14:creationId xmlns:p14="http://schemas.microsoft.com/office/powerpoint/2010/main" val="4149952699"/>
+      </p:ext>
+    </p:extLst>
+  </p:cSld>
+  <p:clrMapOvr>
+    <a:masterClrMapping/>
+  </p:clrMapOvr>
+</p:sld>
+</file>
+
+<file path=ppt/slides/slide4.xml><?xml version="1.0" encoding="utf-8"?>
+<p:sld xmlns:a="http://schemas.openxmlformats.org/drawingml/2006/main" xmlns:r="http://schemas.openxmlformats.org/officeDocument/2006/relationships" xmlns:p="http://schemas.openxmlformats.org/presentationml/2006/main">
+  <p:cSld>
+    <p:spTree>
+      <p:nvGrpSpPr>
+        <p:cNvPr id="1" name=""/>
+        <p:cNvGrpSpPr/>
+        <p:nvPr/>
+      </p:nvGrpSpPr>
+      <p:grpSpPr>
+        <a:xfrm>
+          <a:off x="0" y="0"/>
+          <a:ext cx="0" cy="0"/>
+          <a:chOff x="0" y="0"/>
+          <a:chExt cx="0" cy="0"/>
+        </a:xfrm>
+      </p:grpSpPr>
+      <p:sp>
+        <p:nvSpPr>
+          <p:cNvPr id="2" name="Title 1"/>
+          <p:cNvSpPr>
+            <a:spLocks noGrp="1"/>
+          </p:cNvSpPr>
+          <p:nvPr>
+            <p:ph type="title"/>
+          </p:nvPr>
+        </p:nvSpPr>
+        <p:spPr/>
+        <p:txBody>
+          <a:bodyPr/>
+          <a:lstStyle/>
+          <a:p>
+            <a:r>
+              <a:rPr lang="en-US" dirty="0" smtClean="0"/>
+              <a:t>MYSQL </a:t>
+            </a:r>
+            <a:r>
+              <a:rPr lang="bg-BG" dirty="0" smtClean="0"/>
+              <a:t>база данни</a:t>
+            </a:r>
+            <a:endParaRPr lang="en-US" dirty="0"/>
+          </a:p>
+        </p:txBody>
+      </p:sp>
+      <p:sp>
+        <p:nvSpPr>
+          <p:cNvPr id="3" name="Content Placeholder 2"/>
+          <p:cNvSpPr>
+            <a:spLocks noGrp="1"/>
+          </p:cNvSpPr>
+          <p:nvPr>
+            <p:ph sz="quarter" idx="13"/>
+          </p:nvPr>
+        </p:nvSpPr>
+        <p:spPr/>
+        <p:txBody>
+          <a:bodyPr/>
+          <a:lstStyle/>
+          <a:p>
+            <a:r>
+              <a:rPr lang="bg-BG" dirty="0" smtClean="0"/>
+              <a:t>Релационна база данни</a:t>
+            </a:r>
+          </a:p>
+          <a:p>
+            <a:r>
+              <a:rPr lang="bg-BG" dirty="0" smtClean="0"/>
+              <a:t>Данните се съхраняват в таблици като могат да имат връзки помежду си</a:t>
+            </a:r>
+          </a:p>
+          <a:p>
+            <a:r>
+              <a:rPr lang="bg-BG" dirty="0" smtClean="0"/>
+              <a:t>Стандартизиран език за работа с бази данни </a:t>
+            </a:r>
+            <a:r>
+              <a:rPr lang="en-US" dirty="0" err="1" smtClean="0"/>
+              <a:t>sql</a:t>
+            </a:r>
+            <a:endParaRPr lang="en-US" dirty="0" smtClean="0"/>
+          </a:p>
+          <a:p>
+            <a:r>
+              <a:rPr lang="bg-BG" dirty="0" smtClean="0"/>
+              <a:t>За създаване на бази и таблици и както за изпълнение на заявки използваме </a:t>
+            </a:r>
+            <a:r>
+              <a:rPr lang="en-US" dirty="0" err="1" smtClean="0"/>
+              <a:t>Phpmyadmin</a:t>
+            </a:r>
+            <a:r>
+              <a:rPr lang="en-US" dirty="0" smtClean="0"/>
+              <a:t> </a:t>
+            </a:r>
+            <a:r>
+              <a:rPr lang="bg-BG" dirty="0" smtClean="0"/>
+              <a:t>вграден в </a:t>
+            </a:r>
+            <a:r>
+              <a:rPr lang="en-US" dirty="0" smtClean="0"/>
+              <a:t>XAMPP</a:t>
+            </a:r>
+          </a:p>
+          <a:p>
+            <a:endParaRPr lang="bg-BG" dirty="0" smtClean="0"/>
+          </a:p>
+        </p:txBody>
+      </p:sp>
+    </p:spTree>
+    <p:extLst>
+      <p:ext uri="{BB962C8B-B14F-4D97-AF65-F5344CB8AC3E}">
+        <p14:creationId xmlns:p14="http://schemas.microsoft.com/office/powerpoint/2010/main" val="1108933450"/>
+      </p:ext>
+    </p:extLst>
+  </p:cSld>
+  <p:clrMapOvr>
+    <a:masterClrMapping/>
+  </p:clrMapOvr>
+</p:sld>
+</file>
+
+<file path=ppt/slides/slide5.xml><?xml version="1.0" encoding="utf-8"?>
+<p:sld xmlns:a="http://schemas.openxmlformats.org/drawingml/2006/main" xmlns:r="http://schemas.openxmlformats.org/officeDocument/2006/relationships" xmlns:p="http://schemas.openxmlformats.org/presentationml/2006/main">
+  <p:cSld>
+    <p:spTree>
+      <p:nvGrpSpPr>
+        <p:cNvPr id="1" name=""/>
+        <p:cNvGrpSpPr/>
+        <p:nvPr/>
+      </p:nvGrpSpPr>
+      <p:grpSpPr>
+        <a:xfrm>
+          <a:off x="0" y="0"/>
+          <a:ext cx="0" cy="0"/>
+          <a:chOff x="0" y="0"/>
+          <a:chExt cx="0" cy="0"/>
+        </a:xfrm>
+      </p:grpSpPr>
+      <p:sp>
+        <p:nvSpPr>
+          <p:cNvPr id="2" name="Title 1"/>
+          <p:cNvSpPr>
+            <a:spLocks noGrp="1"/>
+          </p:cNvSpPr>
+          <p:nvPr>
+            <p:ph type="title"/>
+          </p:nvPr>
+        </p:nvSpPr>
+        <p:spPr/>
+        <p:txBody>
+          <a:bodyPr/>
+          <a:lstStyle/>
+          <a:p>
+            <a:r>
+              <a:rPr lang="en-US" dirty="0"/>
+              <a:t>MYSQL </a:t>
+            </a:r>
+            <a:r>
+              <a:rPr lang="bg-BG" dirty="0"/>
+              <a:t>база </a:t>
+            </a:r>
+            <a:r>
+              <a:rPr lang="bg-BG" dirty="0" smtClean="0"/>
+              <a:t>данни</a:t>
+            </a:r>
+            <a:r>
+              <a:rPr lang="en-US" dirty="0" smtClean="0"/>
+              <a:t> </a:t>
+            </a:r>
+            <a:r>
+              <a:rPr lang="bg-BG" dirty="0" smtClean="0"/>
+              <a:t>ДЕМО</a:t>
+            </a:r>
+            <a:endParaRPr lang="en-US" dirty="0"/>
+          </a:p>
+        </p:txBody>
+      </p:sp>
+      <p:pic>
+        <p:nvPicPr>
+          <p:cNvPr id="1026" name="Picture 2" descr="http://www.arvixe.com/images/landing_pages/mysql_hosting.png"/>
+          <p:cNvPicPr>
+            <a:picLocks noChangeAspect="1" noChangeArrowheads="1"/>
+          </p:cNvPicPr>
+          <p:nvPr/>
+        </p:nvPicPr>
+        <p:blipFill>
+          <a:blip r:embed="rId2">
+            <a:extLst>
+              <a:ext uri="{28A0092B-C50C-407E-A947-70E740481C1C}">
+                <a14:useLocalDpi xmlns:a14="http://schemas.microsoft.com/office/drawing/2010/main" val="0"/>
+              </a:ext>
+            </a:extLst>
+          </a:blip>
+          <a:srcRect/>
+          <a:stretch>
+            <a:fillRect/>
+          </a:stretch>
+        </p:blipFill>
+        <p:spPr bwMode="auto">
+          <a:xfrm>
+            <a:off x="3735388" y="2223402"/>
+            <a:ext cx="4721224" cy="4721224"/>
+          </a:xfrm>
+          <a:prstGeom prst="rect">
+            <a:avLst/>
+          </a:prstGeom>
+          <a:noFill/>
+          <a:extLst>
+            <a:ext uri="{909E8E84-426E-40DD-AFC4-6F175D3DCCD1}">
+              <a14:hiddenFill xmlns:a14="http://schemas.microsoft.com/office/drawing/2010/main">
+                <a:solidFill>
+                  <a:srgbClr val="FFFFFF"/>
+                </a:solidFill>
+              </a14:hiddenFill>
+            </a:ext>
+          </a:extLst>
+        </p:spPr>
+      </p:pic>
+    </p:spTree>
+    <p:extLst>
+      <p:ext uri="{BB962C8B-B14F-4D97-AF65-F5344CB8AC3E}">
+        <p14:creationId xmlns:p14="http://schemas.microsoft.com/office/powerpoint/2010/main" val="3965117698"/>
+      </p:ext>
+    </p:extLst>
+  </p:cSld>
+  <p:clrMapOvr>
+    <a:masterClrMapping/>
+  </p:clrMapOvr>
+</p:sld>
+</file>
+
+<file path=ppt/slides/slide6.xml><?xml version="1.0" encoding="utf-8"?>
+<p:sld xmlns:a="http://schemas.openxmlformats.org/drawingml/2006/main" xmlns:r="http://schemas.openxmlformats.org/officeDocument/2006/relationships" xmlns:p="http://schemas.openxmlformats.org/presentationml/2006/main">
+  <p:cSld>
+    <p:spTree>
+      <p:nvGrpSpPr>
+        <p:cNvPr id="1" name=""/>
+        <p:cNvGrpSpPr/>
+        <p:nvPr/>
+      </p:nvGrpSpPr>
+      <p:grpSpPr>
+        <a:xfrm>
+          <a:off x="0" y="0"/>
+          <a:ext cx="0" cy="0"/>
+          <a:chOff x="0" y="0"/>
+          <a:chExt cx="0" cy="0"/>
+        </a:xfrm>
+      </p:grpSpPr>
+      <p:sp>
+        <p:nvSpPr>
+          <p:cNvPr id="2" name="Title 1"/>
+          <p:cNvSpPr>
+            <a:spLocks noGrp="1"/>
+          </p:cNvSpPr>
+          <p:nvPr>
+            <p:ph type="title"/>
+          </p:nvPr>
+        </p:nvSpPr>
+        <p:spPr/>
+        <p:txBody>
+          <a:bodyPr/>
+          <a:lstStyle/>
+          <a:p>
+            <a:r>
+              <a:rPr lang="bg-BG" dirty="0" smtClean="0"/>
+              <a:t>Създаване на бази и таблици</a:t>
+            </a:r>
+            <a:endParaRPr lang="en-US" dirty="0"/>
+          </a:p>
+        </p:txBody>
+      </p:sp>
+      <p:sp>
+        <p:nvSpPr>
+          <p:cNvPr id="3" name="Content Placeholder 2"/>
+          <p:cNvSpPr>
+            <a:spLocks noGrp="1"/>
+          </p:cNvSpPr>
+          <p:nvPr>
+            <p:ph sz="quarter" idx="13"/>
+          </p:nvPr>
+        </p:nvSpPr>
+        <p:spPr/>
+        <p:txBody>
+          <a:bodyPr>
+            <a:normAutofit/>
+          </a:bodyPr>
+          <a:lstStyle/>
+          <a:p>
+            <a:r>
+              <a:rPr lang="bg-BG" dirty="0" smtClean="0"/>
+              <a:t>Характерно за таблиците в </a:t>
+            </a:r>
+            <a:r>
+              <a:rPr lang="en-US" dirty="0" err="1" smtClean="0"/>
+              <a:t>mysql</a:t>
+            </a:r>
+            <a:r>
+              <a:rPr lang="en-US" dirty="0" smtClean="0"/>
+              <a:t> </a:t>
+            </a:r>
+            <a:r>
+              <a:rPr lang="bg-BG" dirty="0" smtClean="0"/>
+              <a:t>е да имат </a:t>
+            </a:r>
+            <a:r>
+              <a:rPr lang="en-US" dirty="0" smtClean="0"/>
+              <a:t>primary key </a:t>
+            </a:r>
+            <a:r>
+              <a:rPr lang="bg-BG" dirty="0" smtClean="0"/>
+              <a:t>идентификатор, който се използва за </a:t>
+            </a:r>
+            <a:r>
+              <a:rPr lang="en-US" dirty="0" smtClean="0"/>
+              <a:t>id (</a:t>
+            </a:r>
+            <a:r>
+              <a:rPr lang="bg-BG" dirty="0" smtClean="0"/>
+              <a:t>ключ, уникална за елемента стойност</a:t>
+            </a:r>
+            <a:r>
+              <a:rPr lang="en-US" dirty="0" smtClean="0"/>
+              <a:t>)</a:t>
+            </a:r>
+            <a:endParaRPr lang="bg-BG" dirty="0" smtClean="0"/>
+          </a:p>
+          <a:p>
+            <a:r>
+              <a:rPr lang="bg-BG" dirty="0" smtClean="0"/>
+              <a:t>Връзките между таблиците се извършват с помощта на </a:t>
+            </a:r>
+            <a:r>
+              <a:rPr lang="en-US" dirty="0" smtClean="0"/>
+              <a:t>foreign key</a:t>
+            </a:r>
+            <a:r>
+              <a:rPr lang="bg-BG" dirty="0"/>
+              <a:t> </a:t>
+            </a:r>
+            <a:r>
+              <a:rPr lang="bg-BG" dirty="0" smtClean="0"/>
+              <a:t>(ключ към друга таблица)</a:t>
+            </a:r>
+          </a:p>
+          <a:p>
+            <a:r>
+              <a:rPr lang="bg-BG" dirty="0" smtClean="0"/>
+              <a:t>Колоните в дадена таблица имат тип в зависимост от данните които съхраняват</a:t>
+            </a:r>
+          </a:p>
+          <a:p>
+            <a:r>
+              <a:rPr lang="bg-BG" dirty="0" smtClean="0"/>
+              <a:t>Таблици могат да се създават както с програмен код така и с помощта на </a:t>
+            </a:r>
+            <a:r>
+              <a:rPr lang="en-US" dirty="0" err="1" smtClean="0"/>
+              <a:t>phpmyadmi</a:t>
+            </a:r>
+            <a:r>
+              <a:rPr lang="bg-BG" dirty="0" smtClean="0"/>
+              <a:t> (Или друг вид софтуер за работа с бази данни)</a:t>
+            </a:r>
+            <a:endParaRPr lang="en-US" dirty="0"/>
+          </a:p>
+        </p:txBody>
+      </p:sp>
+    </p:spTree>
+    <p:extLst>
+      <p:ext uri="{BB962C8B-B14F-4D97-AF65-F5344CB8AC3E}">
+        <p14:creationId xmlns:p14="http://schemas.microsoft.com/office/powerpoint/2010/main" val="1983241322"/>
+      </p:ext>
+    </p:extLst>
+  </p:cSld>
+  <p:clrMapOvr>
+    <a:masterClrMapping/>
+  </p:clrMapOvr>
+</p:sld>
+</file>
+
+<file path=ppt/slides/slide7.xml><?xml version="1.0" encoding="utf-8"?>
+<p:sld xmlns:a="http://schemas.openxmlformats.org/drawingml/2006/main" xmlns:r="http://schemas.openxmlformats.org/officeDocument/2006/relationships" xmlns:p="http://schemas.openxmlformats.org/presentationml/2006/main">
+  <p:cSld>
+    <p:spTree>
+      <p:nvGrpSpPr>
+        <p:cNvPr id="1" name=""/>
+        <p:cNvGrpSpPr/>
+        <p:nvPr/>
+      </p:nvGrpSpPr>
+      <p:grpSpPr>
+        <a:xfrm>
+          <a:off x="0" y="0"/>
+          <a:ext cx="0" cy="0"/>
+          <a:chOff x="0" y="0"/>
+          <a:chExt cx="0" cy="0"/>
+        </a:xfrm>
+      </p:grpSpPr>
+      <p:sp>
+        <p:nvSpPr>
+          <p:cNvPr id="2" name="Title 1"/>
+          <p:cNvSpPr>
+            <a:spLocks noGrp="1"/>
+          </p:cNvSpPr>
+          <p:nvPr>
+            <p:ph type="title"/>
+          </p:nvPr>
+        </p:nvSpPr>
+        <p:spPr/>
+        <p:txBody>
+          <a:bodyPr/>
+          <a:lstStyle/>
+          <a:p>
+            <a:r>
+              <a:rPr lang="bg-BG" dirty="0"/>
+              <a:t>Създаване на бази и </a:t>
+            </a:r>
+            <a:r>
+              <a:rPr lang="bg-BG" dirty="0" smtClean="0"/>
+              <a:t>таблици демо</a:t>
+            </a:r>
+            <a:endParaRPr lang="en-US" dirty="0"/>
+          </a:p>
+        </p:txBody>
+      </p:sp>
+      <p:pic>
+        <p:nvPicPr>
+          <p:cNvPr id="2050" name="Picture 2" descr="http://www.a2ftweaks.com/img/network-database.png"/>
+          <p:cNvPicPr>
+            <a:picLocks noChangeAspect="1" noChangeArrowheads="1"/>
+          </p:cNvPicPr>
+          <p:nvPr/>
+        </p:nvPicPr>
+        <p:blipFill>
+          <a:blip r:embed="rId2">
+            <a:extLst>
+              <a:ext uri="{28A0092B-C50C-407E-A947-70E740481C1C}">
+                <a14:useLocalDpi xmlns:a14="http://schemas.microsoft.com/office/drawing/2010/main" val="0"/>
+              </a:ext>
+            </a:extLst>
+          </a:blip>
+          <a:srcRect/>
+          <a:stretch>
+            <a:fillRect/>
+          </a:stretch>
+        </p:blipFill>
+        <p:spPr bwMode="auto">
+          <a:xfrm>
+            <a:off x="4191818" y="2214694"/>
+            <a:ext cx="3808363" cy="3808364"/>
+          </a:xfrm>
+          <a:prstGeom prst="rect">
+            <a:avLst/>
+          </a:prstGeom>
+          <a:noFill/>
+          <a:extLst>
+            <a:ext uri="{909E8E84-426E-40DD-AFC4-6F175D3DCCD1}">
+              <a14:hiddenFill xmlns:a14="http://schemas.microsoft.com/office/drawing/2010/main">
+                <a:solidFill>
+                  <a:srgbClr val="FFFFFF"/>
+                </a:solidFill>
+              </a14:hiddenFill>
+            </a:ext>
+          </a:extLst>
+        </p:spPr>
+      </p:pic>
+    </p:spTree>
+    <p:extLst>
+      <p:ext uri="{BB962C8B-B14F-4D97-AF65-F5344CB8AC3E}">
+        <p14:creationId xmlns:p14="http://schemas.microsoft.com/office/powerpoint/2010/main" val="3378663057"/>
+      </p:ext>
+    </p:extLst>
+  </p:cSld>
+  <p:clrMapOvr>
+    <a:masterClrMapping/>
+  </p:clrMapOvr>
+</p:sld>
+</file>
+
+<file path=ppt/slides/slide8.xml><?xml version="1.0" encoding="utf-8"?>
+<p:sld xmlns:a="http://schemas.openxmlformats.org/drawingml/2006/main" xmlns:r="http://schemas.openxmlformats.org/officeDocument/2006/relationships" xmlns:p="http://schemas.openxmlformats.org/presentationml/2006/main">
+  <p:cSld>
+    <p:spTree>
+      <p:nvGrpSpPr>
+        <p:cNvPr id="1" name=""/>
+        <p:cNvGrpSpPr/>
+        <p:nvPr/>
+      </p:nvGrpSpPr>
+      <p:grpSpPr>
+        <a:xfrm>
+          <a:off x="0" y="0"/>
+          <a:ext cx="0" cy="0"/>
+          <a:chOff x="0" y="0"/>
+          <a:chExt cx="0" cy="0"/>
+        </a:xfrm>
+      </p:grpSpPr>
+      <p:sp>
+        <p:nvSpPr>
+          <p:cNvPr id="2" name="Title 1"/>
+          <p:cNvSpPr>
+            <a:spLocks noGrp="1"/>
+          </p:cNvSpPr>
+          <p:nvPr>
+            <p:ph type="title"/>
+          </p:nvPr>
+        </p:nvSpPr>
+        <p:spPr/>
+        <p:txBody>
+          <a:bodyPr/>
+          <a:lstStyle/>
+          <a:p>
+            <a:r>
+              <a:rPr lang="bg-BG" dirty="0" smtClean="0"/>
+              <a:t>Редактиране на структурата на таблица</a:t>
+            </a:r>
+            <a:endParaRPr lang="en-US" dirty="0"/>
+          </a:p>
+        </p:txBody>
+      </p:sp>
+      <p:sp>
+        <p:nvSpPr>
+          <p:cNvPr id="3" name="Content Placeholder 2"/>
+          <p:cNvSpPr>
+            <a:spLocks noGrp="1"/>
+          </p:cNvSpPr>
+          <p:nvPr>
+            <p:ph sz="quarter" idx="13"/>
+          </p:nvPr>
+        </p:nvSpPr>
+        <p:spPr/>
+        <p:txBody>
+          <a:bodyPr/>
+          <a:lstStyle/>
+          <a:p>
+            <a:r>
+              <a:rPr lang="bg-BG" dirty="0" smtClean="0"/>
+              <a:t>Редакцията става чрез командата </a:t>
+            </a:r>
+            <a:r>
+              <a:rPr lang="en-US" dirty="0" smtClean="0"/>
+              <a:t>alter</a:t>
+            </a:r>
+          </a:p>
+          <a:p>
+            <a:r>
+              <a:rPr lang="bg-BG" dirty="0" smtClean="0"/>
+              <a:t>При редакция на таблица не трябва да поставяме правило на което някои от редовете на таблицата не отговарят</a:t>
+            </a:r>
+          </a:p>
+          <a:p>
+            <a:r>
+              <a:rPr lang="bg-BG" dirty="0" smtClean="0"/>
+              <a:t>Често пъти редакцията на таблица е съпроводено с промяна на редовете</a:t>
+            </a:r>
+            <a:endParaRPr lang="en-US" dirty="0" smtClean="0"/>
+          </a:p>
+          <a:p>
+            <a:r>
+              <a:rPr lang="bg-BG" dirty="0" smtClean="0"/>
+              <a:t>Пълна информация за редакция на структурата на таблици в </a:t>
+            </a:r>
+            <a:r>
+              <a:rPr lang="en-US" dirty="0" err="1" smtClean="0"/>
+              <a:t>mysql</a:t>
+            </a:r>
+            <a:r>
+              <a:rPr lang="en-US" dirty="0" smtClean="0"/>
+              <a:t> </a:t>
+            </a:r>
+            <a:r>
+              <a:rPr lang="bg-BG" dirty="0" smtClean="0"/>
+              <a:t>може да видите тук:</a:t>
+            </a:r>
+          </a:p>
+          <a:p>
+            <a:pPr marL="0" indent="0">
+              <a:buNone/>
+            </a:pPr>
+            <a:r>
+              <a:rPr lang="en-US" dirty="0">
+                <a:hlinkClick r:id="rId2"/>
+              </a:rPr>
+              <a:t>http://dev.mysql.com/doc/refman/5.1/en/alter-table-examples.html</a:t>
+            </a:r>
+            <a:endParaRPr lang="en-US" dirty="0"/>
+          </a:p>
+        </p:txBody>
+      </p:sp>
+    </p:spTree>
+    <p:extLst>
+      <p:ext uri="{BB962C8B-B14F-4D97-AF65-F5344CB8AC3E}">
+        <p14:creationId xmlns:p14="http://schemas.microsoft.com/office/powerpoint/2010/main" val="255504822"/>
+      </p:ext>
+    </p:extLst>
+  </p:cSld>
+  <p:clrMapOvr>
+    <a:masterClrMapping/>
+  </p:clrMapOvr>
+</p:sld>
+</file>
+
+<file path=ppt/slides/slide9.xml><?xml version="1.0" encoding="utf-8"?>
+<p:sld xmlns:a="http://schemas.openxmlformats.org/drawingml/2006/main" xmlns:r="http://schemas.openxmlformats.org/officeDocument/2006/relationships" xmlns:p="http://schemas.openxmlformats.org/presentationml/2006/main">
+  <p:cSld>
+    <p:spTree>
+      <p:nvGrpSpPr>
+        <p:cNvPr id="1" name=""/>
+        <p:cNvGrpSpPr/>
+        <p:nvPr/>
+      </p:nvGrpSpPr>
+      <p:grpSpPr>
+        <a:xfrm>
+          <a:off x="0" y="0"/>
+          <a:ext cx="0" cy="0"/>
+          <a:chOff x="0" y="0"/>
+          <a:chExt cx="0" cy="0"/>
+        </a:xfrm>
+      </p:grpSpPr>
+      <p:sp>
+        <p:nvSpPr>
+          <p:cNvPr id="2" name="Title 1"/>
+          <p:cNvSpPr>
+            <a:spLocks noGrp="1"/>
+          </p:cNvSpPr>
+          <p:nvPr>
+            <p:ph type="title"/>
+          </p:nvPr>
+        </p:nvSpPr>
+        <p:spPr/>
+        <p:txBody>
+          <a:bodyPr/>
+          <a:lstStyle/>
+          <a:p>
+            <a:r>
+              <a:rPr lang="bg-BG" dirty="0"/>
+              <a:t>Редактиране на структурата на </a:t>
+            </a:r>
+            <a:r>
+              <a:rPr lang="bg-BG" dirty="0" smtClean="0"/>
+              <a:t>таблица демо</a:t>
+            </a:r>
+            <a:endParaRPr lang="en-US" dirty="0"/>
+          </a:p>
+        </p:txBody>
+      </p:sp>
+      <p:pic>
+        <p:nvPicPr>
+          <p:cNvPr id="4098" name="Picture 2" descr="https://cdn4.iconfinder.com/data/icons/meBaze-Freebies/512/edit-notes.png"/>
+          <p:cNvPicPr>
+            <a:picLocks noChangeAspect="1" noChangeArrowheads="1"/>
+          </p:cNvPicPr>
+          <p:nvPr/>
+        </p:nvPicPr>
+        <p:blipFill>
+          <a:blip r:embed="rId2">
+            <a:extLst>
+              <a:ext uri="{28A0092B-C50C-407E-A947-70E740481C1C}">
+                <a14:useLocalDpi xmlns:a14="http://schemas.microsoft.com/office/drawing/2010/main" val="0"/>
+              </a:ext>
+            </a:extLst>
+          </a:blip>
+          <a:srcRect/>
+          <a:stretch>
+            <a:fillRect/>
+          </a:stretch>
+        </p:blipFill>
+        <p:spPr bwMode="auto">
+          <a:xfrm>
+            <a:off x="3657600" y="1902686"/>
+            <a:ext cx="4876800" cy="4876801"/>
+          </a:xfrm>
+          <a:prstGeom prst="rect">
+            <a:avLst/>
+          </a:prstGeom>
+          <a:noFill/>
+          <a:extLst>
+            <a:ext uri="{909E8E84-426E-40DD-AFC4-6F175D3DCCD1}">
+              <a14:hiddenFill xmlns:a14="http://schemas.microsoft.com/office/drawing/2010/main">
+                <a:solidFill>
+                  <a:srgbClr val="FFFFFF"/>
+                </a:solidFill>
+              </a14:hiddenFill>
+            </a:ext>
+          </a:extLst>
+        </p:spPr>
+      </p:pic>
+    </p:spTree>
+    <p:extLst>
+      <p:ext uri="{BB962C8B-B14F-4D97-AF65-F5344CB8AC3E}">
+        <p14:creationId xmlns:p14="http://schemas.microsoft.com/office/powerpoint/2010/main" val="1102332790"/>
       </p:ext>
     </p:extLst>
   </p:cSld>

</xml_diff>